<commit_message>
Added Physics Cycle stuff
</commit_message>
<xml_diff>
--- a/1st-Sem-Chem-Cycle/Subject_Files/chemistry/Unit 1/UE20CY101_UNIT I_Class_ Computational chemistry.pptx
+++ b/1st-Sem-Chem-Cycle/Subject_Files/chemistry/Unit 1/UE20CY101_UNIT I_Class_ Computational chemistry.pptx
@@ -128,7 +128,7 @@
   </p:defaultTextStyle>
   <p:extLst>
     <p:ext uri="{EFAFB233-063F-42B5-8137-9DF3F51BA10A}">
-      <p15:sldGuideLst xmlns="" xmlns:p15="http://schemas.microsoft.com/office/powerpoint/2012/main">
+      <p15:sldGuideLst xmlns:p15="http://schemas.microsoft.com/office/powerpoint/2012/main">
         <p15:guide id="1" orient="horz" pos="2160">
           <p15:clr>
             <a:srgbClr val="A4A3A4"/>
@@ -1234,13 +1234,6 @@
         </dgm:presLayoutVars>
       </dgm:prSet>
       <dgm:spPr/>
-      <dgm:t>
-        <a:bodyPr/>
-        <a:lstStyle/>
-        <a:p>
-          <a:endParaRPr lang="en-US"/>
-        </a:p>
-      </dgm:t>
     </dgm:pt>
     <dgm:pt modelId="{55FDE51B-0A39-4BD9-B53E-D0E99D5052C1}" type="pres">
       <dgm:prSet presAssocID="{BC1BFF02-32F2-408F-9AB1-3A7CA978000D}" presName="compNode" presStyleCnt="0"/>
@@ -1256,7 +1249,7 @@
                 <a14:useLocalDpi xmlns:a14="http://schemas.microsoft.com/office/drawing/2010/main" val="0"/>
               </a:ext>
               <a:ext uri="{96DAC541-7B7A-43D3-8B79-37D633B846F1}">
-                <asvg:svgBlip xmlns="" xmlns:asvg="http://schemas.microsoft.com/office/drawing/2016/SVG/main" r:embed="rId2"/>
+                <asvg:svgBlip xmlns:asvg="http://schemas.microsoft.com/office/drawing/2016/SVG/main" r:embed="rId2"/>
               </a:ext>
             </a:extLst>
           </a:blip>
@@ -1268,13 +1261,6 @@
           <a:noFill/>
         </a:ln>
       </dgm:spPr>
-      <dgm:t>
-        <a:bodyPr/>
-        <a:lstStyle/>
-        <a:p>
-          <a:endParaRPr lang="en-IN"/>
-        </a:p>
-      </dgm:t>
       <dgm:extLst>
         <a:ext uri="{E40237B7-FDA0-4F09-8148-C483321AD2D9}">
           <dgm14:cNvPr xmlns:dgm14="http://schemas.microsoft.com/office/drawing/2010/diagram" id="0" name="" descr="Computer"/>
@@ -1293,13 +1279,6 @@
         </dgm:presLayoutVars>
       </dgm:prSet>
       <dgm:spPr/>
-      <dgm:t>
-        <a:bodyPr/>
-        <a:lstStyle/>
-        <a:p>
-          <a:endParaRPr lang="en-US"/>
-        </a:p>
-      </dgm:t>
     </dgm:pt>
     <dgm:pt modelId="{D5FE985D-6798-4865-8464-F84D45E12941}" type="pres">
       <dgm:prSet presAssocID="{86A44BB0-BFFC-49E9-99CA-41BF67CED7DA}" presName="sibTrans" presStyleCnt="0"/>
@@ -1319,7 +1298,7 @@
                 <a14:useLocalDpi xmlns:a14="http://schemas.microsoft.com/office/drawing/2010/main" val="0"/>
               </a:ext>
               <a:ext uri="{96DAC541-7B7A-43D3-8B79-37D633B846F1}">
-                <asvg:svgBlip xmlns="" xmlns:asvg="http://schemas.microsoft.com/office/drawing/2016/SVG/main" r:embed="rId4"/>
+                <asvg:svgBlip xmlns:asvg="http://schemas.microsoft.com/office/drawing/2016/SVG/main" r:embed="rId4"/>
               </a:ext>
             </a:extLst>
           </a:blip>
@@ -1331,13 +1310,6 @@
           <a:noFill/>
         </a:ln>
       </dgm:spPr>
-      <dgm:t>
-        <a:bodyPr/>
-        <a:lstStyle/>
-        <a:p>
-          <a:endParaRPr lang="en-IN"/>
-        </a:p>
-      </dgm:t>
       <dgm:extLst>
         <a:ext uri="{E40237B7-FDA0-4F09-8148-C483321AD2D9}">
           <dgm14:cNvPr xmlns:dgm14="http://schemas.microsoft.com/office/drawing/2010/diagram" id="0" name="" descr="Laptop"/>
@@ -1356,13 +1328,6 @@
         </dgm:presLayoutVars>
       </dgm:prSet>
       <dgm:spPr/>
-      <dgm:t>
-        <a:bodyPr/>
-        <a:lstStyle/>
-        <a:p>
-          <a:endParaRPr lang="en-US"/>
-        </a:p>
-      </dgm:t>
     </dgm:pt>
     <dgm:pt modelId="{78DA6409-B8D8-4472-8AFB-04B98526E21E}" type="pres">
       <dgm:prSet presAssocID="{32C8AD2D-C406-4DC5-918F-96DE567C9D83}" presName="sibTrans" presStyleCnt="0"/>
@@ -1382,7 +1347,7 @@
                 <a14:useLocalDpi xmlns:a14="http://schemas.microsoft.com/office/drawing/2010/main" val="0"/>
               </a:ext>
               <a:ext uri="{96DAC541-7B7A-43D3-8B79-37D633B846F1}">
-                <asvg:svgBlip xmlns="" xmlns:asvg="http://schemas.microsoft.com/office/drawing/2016/SVG/main" r:embed="rId6"/>
+                <asvg:svgBlip xmlns:asvg="http://schemas.microsoft.com/office/drawing/2016/SVG/main" r:embed="rId6"/>
               </a:ext>
             </a:extLst>
           </a:blip>
@@ -1394,13 +1359,6 @@
           <a:noFill/>
         </a:ln>
       </dgm:spPr>
-      <dgm:t>
-        <a:bodyPr/>
-        <a:lstStyle/>
-        <a:p>
-          <a:endParaRPr lang="en-IN"/>
-        </a:p>
-      </dgm:t>
       <dgm:extLst>
         <a:ext uri="{E40237B7-FDA0-4F09-8148-C483321AD2D9}">
           <dgm14:cNvPr xmlns:dgm14="http://schemas.microsoft.com/office/drawing/2010/diagram" id="0" name="" descr="Scientist"/>
@@ -1419,22 +1377,15 @@
         </dgm:presLayoutVars>
       </dgm:prSet>
       <dgm:spPr/>
-      <dgm:t>
-        <a:bodyPr/>
-        <a:lstStyle/>
-        <a:p>
-          <a:endParaRPr lang="en-US"/>
-        </a:p>
-      </dgm:t>
     </dgm:pt>
   </dgm:ptLst>
   <dgm:cxnLst>
+    <dgm:cxn modelId="{D2F5670D-0309-41AD-B879-EA9738F1A224}" srcId="{1D545740-849A-42D2-90D9-A59F90585153}" destId="{BC1BFF02-32F2-408F-9AB1-3A7CA978000D}" srcOrd="0" destOrd="0" parTransId="{756B2483-2BBF-418D-8FD0-319DBC86F0CB}" sibTransId="{86A44BB0-BFFC-49E9-99CA-41BF67CED7DA}"/>
+    <dgm:cxn modelId="{EE078D47-7855-41E7-844F-982521234C32}" type="presOf" srcId="{1D545740-849A-42D2-90D9-A59F90585153}" destId="{8ACC1FD1-D55E-42DC-A121-62BD8013A8B5}" srcOrd="0" destOrd="0" presId="urn:microsoft.com/office/officeart/2018/2/layout/IconLabelList"/>
+    <dgm:cxn modelId="{46CC6EE7-C5B3-454E-ABBA-7976228DDE72}" srcId="{1D545740-849A-42D2-90D9-A59F90585153}" destId="{D291A3B3-C7DD-4228-9852-3CF74492A2A9}" srcOrd="2" destOrd="0" parTransId="{66774306-4C54-4D85-9D5D-47A5A863B311}" sibTransId="{7DCF6E8C-7DE9-4218-82B5-D281E62B6523}"/>
+    <dgm:cxn modelId="{180948E8-EE54-4D9A-AEF3-105779BCB5CB}" type="presOf" srcId="{F49EAF8A-B9AE-48B6-85FE-756565B9E6B1}" destId="{66B15C2E-4D06-4CEF-A176-8BC2FB4EE4AA}" srcOrd="0" destOrd="0" presId="urn:microsoft.com/office/officeart/2018/2/layout/IconLabelList"/>
+    <dgm:cxn modelId="{A652E3EB-CC4A-47FA-B68A-E85551147EE4}" type="presOf" srcId="{D291A3B3-C7DD-4228-9852-3CF74492A2A9}" destId="{9D49E74B-AB44-419E-A3C9-77C360306E7D}" srcOrd="0" destOrd="0" presId="urn:microsoft.com/office/officeart/2018/2/layout/IconLabelList"/>
     <dgm:cxn modelId="{4E0335F6-605B-462D-8C8D-CBC3C755DAD6}" srcId="{1D545740-849A-42D2-90D9-A59F90585153}" destId="{F49EAF8A-B9AE-48B6-85FE-756565B9E6B1}" srcOrd="1" destOrd="0" parTransId="{794A0F48-3EB8-4A42-980E-C64C875BE5CD}" sibTransId="{32C8AD2D-C406-4DC5-918F-96DE567C9D83}"/>
-    <dgm:cxn modelId="{46CC6EE7-C5B3-454E-ABBA-7976228DDE72}" srcId="{1D545740-849A-42D2-90D9-A59F90585153}" destId="{D291A3B3-C7DD-4228-9852-3CF74492A2A9}" srcOrd="2" destOrd="0" parTransId="{66774306-4C54-4D85-9D5D-47A5A863B311}" sibTransId="{7DCF6E8C-7DE9-4218-82B5-D281E62B6523}"/>
-    <dgm:cxn modelId="{D2F5670D-0309-41AD-B879-EA9738F1A224}" srcId="{1D545740-849A-42D2-90D9-A59F90585153}" destId="{BC1BFF02-32F2-408F-9AB1-3A7CA978000D}" srcOrd="0" destOrd="0" parTransId="{756B2483-2BBF-418D-8FD0-319DBC86F0CB}" sibTransId="{86A44BB0-BFFC-49E9-99CA-41BF67CED7DA}"/>
-    <dgm:cxn modelId="{180948E8-EE54-4D9A-AEF3-105779BCB5CB}" type="presOf" srcId="{F49EAF8A-B9AE-48B6-85FE-756565B9E6B1}" destId="{66B15C2E-4D06-4CEF-A176-8BC2FB4EE4AA}" srcOrd="0" destOrd="0" presId="urn:microsoft.com/office/officeart/2018/2/layout/IconLabelList"/>
-    <dgm:cxn modelId="{EE078D47-7855-41E7-844F-982521234C32}" type="presOf" srcId="{1D545740-849A-42D2-90D9-A59F90585153}" destId="{8ACC1FD1-D55E-42DC-A121-62BD8013A8B5}" srcOrd="0" destOrd="0" presId="urn:microsoft.com/office/officeart/2018/2/layout/IconLabelList"/>
-    <dgm:cxn modelId="{A652E3EB-CC4A-47FA-B68A-E85551147EE4}" type="presOf" srcId="{D291A3B3-C7DD-4228-9852-3CF74492A2A9}" destId="{9D49E74B-AB44-419E-A3C9-77C360306E7D}" srcOrd="0" destOrd="0" presId="urn:microsoft.com/office/officeart/2018/2/layout/IconLabelList"/>
     <dgm:cxn modelId="{3944E4F8-F9B5-4882-8DE2-062EAEE32A47}" type="presOf" srcId="{BC1BFF02-32F2-408F-9AB1-3A7CA978000D}" destId="{51CA8C7E-DFF1-4E5E-97FC-3E13525F0AE8}" srcOrd="0" destOrd="0" presId="urn:microsoft.com/office/officeart/2018/2/layout/IconLabelList"/>
     <dgm:cxn modelId="{C323E499-5E0A-48FB-96A6-089ED12CE393}" type="presParOf" srcId="{8ACC1FD1-D55E-42DC-A121-62BD8013A8B5}" destId="{55FDE51B-0A39-4BD9-B53E-D0E99D5052C1}" srcOrd="0" destOrd="0" presId="urn:microsoft.com/office/officeart/2018/2/layout/IconLabelList"/>
     <dgm:cxn modelId="{F76B44DF-D7B8-4620-BB5B-90E306BF43FA}" type="presParOf" srcId="{55FDE51B-0A39-4BD9-B53E-D0E99D5052C1}" destId="{62B7D6F3-B085-411A-AB20-545637E2B23A}" srcOrd="0" destOrd="0" presId="urn:microsoft.com/office/officeart/2018/2/layout/IconLabelList"/>
@@ -1489,7 +1440,7 @@
                 <a14:useLocalDpi xmlns:a14="http://schemas.microsoft.com/office/drawing/2010/main" val="0"/>
               </a:ext>
               <a:ext uri="{96DAC541-7B7A-43D3-8B79-37D633B846F1}">
-                <asvg:svgBlip xmlns="" xmlns:asvg="http://schemas.microsoft.com/office/drawing/2016/SVG/main" r:embed="rId2"/>
+                <asvg:svgBlip xmlns:asvg="http://schemas.microsoft.com/office/drawing/2016/SVG/main" r:embed="rId2"/>
               </a:ext>
             </a:extLst>
           </a:blip>
@@ -1556,7 +1507,7 @@
         </a:bodyPr>
         <a:lstStyle/>
         <a:p>
-          <a:pPr lvl="0" algn="ctr" defTabSz="711200">
+          <a:pPr marL="0" lvl="0" indent="0" algn="ctr" defTabSz="711200">
             <a:lnSpc>
               <a:spcPct val="100000"/>
             </a:lnSpc>
@@ -1566,6 +1517,7 @@
             <a:spcAft>
               <a:spcPct val="35000"/>
             </a:spcAft>
+            <a:buNone/>
           </a:pPr>
           <a:r>
             <a:rPr lang="en-US" sz="1600" b="1" kern="1200" dirty="0"/>
@@ -1603,7 +1555,7 @@
                 <a14:useLocalDpi xmlns:a14="http://schemas.microsoft.com/office/drawing/2010/main" val="0"/>
               </a:ext>
               <a:ext uri="{96DAC541-7B7A-43D3-8B79-37D633B846F1}">
-                <asvg:svgBlip xmlns="" xmlns:asvg="http://schemas.microsoft.com/office/drawing/2016/SVG/main" r:embed="rId4"/>
+                <asvg:svgBlip xmlns:asvg="http://schemas.microsoft.com/office/drawing/2016/SVG/main" r:embed="rId4"/>
               </a:ext>
             </a:extLst>
           </a:blip>
@@ -1670,7 +1622,7 @@
         </a:bodyPr>
         <a:lstStyle/>
         <a:p>
-          <a:pPr lvl="0" algn="ctr" defTabSz="800100">
+          <a:pPr marL="0" lvl="0" indent="0" algn="ctr" defTabSz="800100">
             <a:lnSpc>
               <a:spcPct val="100000"/>
             </a:lnSpc>
@@ -1680,6 +1632,7 @@
             <a:spcAft>
               <a:spcPct val="35000"/>
             </a:spcAft>
+            <a:buNone/>
           </a:pPr>
           <a:r>
             <a:rPr lang="en-US" sz="1800" b="1" kern="1200" dirty="0"/>
@@ -1713,7 +1666,7 @@
                 <a14:useLocalDpi xmlns:a14="http://schemas.microsoft.com/office/drawing/2010/main" val="0"/>
               </a:ext>
               <a:ext uri="{96DAC541-7B7A-43D3-8B79-37D633B846F1}">
-                <asvg:svgBlip xmlns="" xmlns:asvg="http://schemas.microsoft.com/office/drawing/2016/SVG/main" r:embed="rId6"/>
+                <asvg:svgBlip xmlns:asvg="http://schemas.microsoft.com/office/drawing/2016/SVG/main" r:embed="rId6"/>
               </a:ext>
             </a:extLst>
           </a:blip>
@@ -1780,7 +1733,7 @@
         </a:bodyPr>
         <a:lstStyle/>
         <a:p>
-          <a:pPr lvl="0" algn="ctr" defTabSz="800100">
+          <a:pPr marL="0" lvl="0" indent="0" algn="ctr" defTabSz="800100">
             <a:lnSpc>
               <a:spcPct val="100000"/>
             </a:lnSpc>
@@ -1790,6 +1743,7 @@
             <a:spcAft>
               <a:spcPct val="35000"/>
             </a:spcAft>
+            <a:buNone/>
           </a:pPr>
           <a:r>
             <a:rPr lang="en-US" sz="1800" b="1" kern="1200" dirty="0"/>
@@ -1985,7 +1939,7 @@
   </dgm:layoutNode>
   <dgm:extLst>
     <a:ext uri="{68A01E43-0DF5-4B5B-8FA6-DAF915123BFB}">
-      <dgm1612:lstStyle xmlns="" xmlns:dgm1612="http://schemas.microsoft.com/office/drawing/2016/12/diagram">
+      <dgm1612:lstStyle xmlns:dgm1612="http://schemas.microsoft.com/office/drawing/2016/12/diagram">
         <a:lvl1pPr>
           <a:lnSpc>
             <a:spcPct val="100000"/>
@@ -3114,7 +3068,7 @@
             <a:fld id="{A6B2D360-7DF4-47E3-9376-871C7C8E9043}" type="datetimeFigureOut">
               <a:rPr lang="en-US" smtClean="0"/>
               <a:pPr/>
-              <a:t>10/19/2024</a:t>
+              <a:t>1/26/2025</a:t>
             </a:fld>
             <a:endParaRPr lang="en-US"/>
           </a:p>
@@ -3180,38 +3134,37 @@
           <a:p>
             <a:pPr lvl="0"/>
             <a:r>
-              <a:rPr lang="en-US" smtClean="0"/>
+              <a:rPr lang="en-US"/>
               <a:t>Click to edit Master text styles</a:t>
             </a:r>
           </a:p>
           <a:p>
             <a:pPr lvl="1"/>
             <a:r>
-              <a:rPr lang="en-US" smtClean="0"/>
+              <a:rPr lang="en-US"/>
               <a:t>Second level</a:t>
             </a:r>
           </a:p>
           <a:p>
             <a:pPr lvl="2"/>
             <a:r>
-              <a:rPr lang="en-US" smtClean="0"/>
+              <a:rPr lang="en-US"/>
               <a:t>Third level</a:t>
             </a:r>
           </a:p>
           <a:p>
             <a:pPr lvl="3"/>
             <a:r>
-              <a:rPr lang="en-US" smtClean="0"/>
+              <a:rPr lang="en-US"/>
               <a:t>Fourth level</a:t>
             </a:r>
           </a:p>
           <a:p>
             <a:pPr lvl="4"/>
             <a:r>
-              <a:rPr lang="en-US" smtClean="0"/>
+              <a:rPr lang="en-US"/>
               <a:t>Fifth level</a:t>
             </a:r>
-            <a:endParaRPr lang="en-US"/>
           </a:p>
         </p:txBody>
       </p:sp>
@@ -4801,7 +4754,7 @@
           <p:cNvPr id="2" name="Title 1">
             <a:extLst>
               <a:ext uri="{FF2B5EF4-FFF2-40B4-BE49-F238E27FC236}">
-                <a16:creationId xmlns="" xmlns:a16="http://schemas.microsoft.com/office/drawing/2014/main" id="{52EC3D4B-626B-4009-8192-CEAEED1423ED}"/>
+                <a16:creationId xmlns:a16="http://schemas.microsoft.com/office/drawing/2014/main" id="{52EC3D4B-626B-4009-8192-CEAEED1423ED}"/>
               </a:ext>
             </a:extLst>
           </p:cNvPr>
@@ -4839,7 +4792,7 @@
           <p:cNvPr id="3" name="Subtitle 2">
             <a:extLst>
               <a:ext uri="{FF2B5EF4-FFF2-40B4-BE49-F238E27FC236}">
-                <a16:creationId xmlns="" xmlns:a16="http://schemas.microsoft.com/office/drawing/2014/main" id="{6A51827C-B164-4C81-9990-CA48A6D6954F}"/>
+                <a16:creationId xmlns:a16="http://schemas.microsoft.com/office/drawing/2014/main" id="{6A51827C-B164-4C81-9990-CA48A6D6954F}"/>
               </a:ext>
             </a:extLst>
           </p:cNvPr>
@@ -4910,7 +4863,7 @@
           <p:cNvPr id="4" name="Date Placeholder 3">
             <a:extLst>
               <a:ext uri="{FF2B5EF4-FFF2-40B4-BE49-F238E27FC236}">
-                <a16:creationId xmlns="" xmlns:a16="http://schemas.microsoft.com/office/drawing/2014/main" id="{507DF93E-677D-48F6-8B5A-46E43F2C154F}"/>
+                <a16:creationId xmlns:a16="http://schemas.microsoft.com/office/drawing/2014/main" id="{507DF93E-677D-48F6-8B5A-46E43F2C154F}"/>
               </a:ext>
             </a:extLst>
           </p:cNvPr>
@@ -4929,7 +4882,7 @@
             <a:fld id="{C0697723-E498-4D64-BBB6-490ED1364AC9}" type="datetimeFigureOut">
               <a:rPr lang="en-IN" smtClean="0"/>
               <a:pPr/>
-              <a:t>19-10-2024</a:t>
+              <a:t>26-01-2025</a:t>
             </a:fld>
             <a:endParaRPr lang="en-IN"/>
           </a:p>
@@ -4940,7 +4893,7 @@
           <p:cNvPr id="5" name="Footer Placeholder 4">
             <a:extLst>
               <a:ext uri="{FF2B5EF4-FFF2-40B4-BE49-F238E27FC236}">
-                <a16:creationId xmlns="" xmlns:a16="http://schemas.microsoft.com/office/drawing/2014/main" id="{B1DF4446-763D-4DB5-A60E-E76234DDA4B8}"/>
+                <a16:creationId xmlns:a16="http://schemas.microsoft.com/office/drawing/2014/main" id="{B1DF4446-763D-4DB5-A60E-E76234DDA4B8}"/>
               </a:ext>
             </a:extLst>
           </p:cNvPr>
@@ -4965,7 +4918,7 @@
           <p:cNvPr id="6" name="Slide Number Placeholder 5">
             <a:extLst>
               <a:ext uri="{FF2B5EF4-FFF2-40B4-BE49-F238E27FC236}">
-                <a16:creationId xmlns="" xmlns:a16="http://schemas.microsoft.com/office/drawing/2014/main" id="{E782FF9A-F0E6-4BE5-A785-09D93A759624}"/>
+                <a16:creationId xmlns:a16="http://schemas.microsoft.com/office/drawing/2014/main" id="{E782FF9A-F0E6-4BE5-A785-09D93A759624}"/>
               </a:ext>
             </a:extLst>
           </p:cNvPr>
@@ -5025,7 +4978,7 @@
           <p:cNvPr id="2" name="Title 1">
             <a:extLst>
               <a:ext uri="{FF2B5EF4-FFF2-40B4-BE49-F238E27FC236}">
-                <a16:creationId xmlns="" xmlns:a16="http://schemas.microsoft.com/office/drawing/2014/main" id="{9BEE96CC-24D7-4AC0-845A-98CA572FE6D7}"/>
+                <a16:creationId xmlns:a16="http://schemas.microsoft.com/office/drawing/2014/main" id="{9BEE96CC-24D7-4AC0-845A-98CA572FE6D7}"/>
               </a:ext>
             </a:extLst>
           </p:cNvPr>
@@ -5054,7 +5007,7 @@
           <p:cNvPr id="3" name="Vertical Text Placeholder 2">
             <a:extLst>
               <a:ext uri="{FF2B5EF4-FFF2-40B4-BE49-F238E27FC236}">
-                <a16:creationId xmlns="" xmlns:a16="http://schemas.microsoft.com/office/drawing/2014/main" id="{E2261921-3E80-4007-9849-91F4F1D9CF42}"/>
+                <a16:creationId xmlns:a16="http://schemas.microsoft.com/office/drawing/2014/main" id="{E2261921-3E80-4007-9849-91F4F1D9CF42}"/>
               </a:ext>
             </a:extLst>
           </p:cNvPr>
@@ -5112,7 +5065,7 @@
           <p:cNvPr id="4" name="Date Placeholder 3">
             <a:extLst>
               <a:ext uri="{FF2B5EF4-FFF2-40B4-BE49-F238E27FC236}">
-                <a16:creationId xmlns="" xmlns:a16="http://schemas.microsoft.com/office/drawing/2014/main" id="{26A091F3-2079-48AC-A58B-4C729775D003}"/>
+                <a16:creationId xmlns:a16="http://schemas.microsoft.com/office/drawing/2014/main" id="{26A091F3-2079-48AC-A58B-4C729775D003}"/>
               </a:ext>
             </a:extLst>
           </p:cNvPr>
@@ -5131,7 +5084,7 @@
             <a:fld id="{C0697723-E498-4D64-BBB6-490ED1364AC9}" type="datetimeFigureOut">
               <a:rPr lang="en-IN" smtClean="0"/>
               <a:pPr/>
-              <a:t>19-10-2024</a:t>
+              <a:t>26-01-2025</a:t>
             </a:fld>
             <a:endParaRPr lang="en-IN"/>
           </a:p>
@@ -5142,7 +5095,7 @@
           <p:cNvPr id="5" name="Footer Placeholder 4">
             <a:extLst>
               <a:ext uri="{FF2B5EF4-FFF2-40B4-BE49-F238E27FC236}">
-                <a16:creationId xmlns="" xmlns:a16="http://schemas.microsoft.com/office/drawing/2014/main" id="{42536A67-7BBF-4557-B86C-E3D43DA80591}"/>
+                <a16:creationId xmlns:a16="http://schemas.microsoft.com/office/drawing/2014/main" id="{42536A67-7BBF-4557-B86C-E3D43DA80591}"/>
               </a:ext>
             </a:extLst>
           </p:cNvPr>
@@ -5167,7 +5120,7 @@
           <p:cNvPr id="6" name="Slide Number Placeholder 5">
             <a:extLst>
               <a:ext uri="{FF2B5EF4-FFF2-40B4-BE49-F238E27FC236}">
-                <a16:creationId xmlns="" xmlns:a16="http://schemas.microsoft.com/office/drawing/2014/main" id="{87DF2A7F-20B3-4FEC-B2FB-22B3B56A9620}"/>
+                <a16:creationId xmlns:a16="http://schemas.microsoft.com/office/drawing/2014/main" id="{87DF2A7F-20B3-4FEC-B2FB-22B3B56A9620}"/>
               </a:ext>
             </a:extLst>
           </p:cNvPr>
@@ -5227,7 +5180,7 @@
           <p:cNvPr id="2" name="Vertical Title 1">
             <a:extLst>
               <a:ext uri="{FF2B5EF4-FFF2-40B4-BE49-F238E27FC236}">
-                <a16:creationId xmlns="" xmlns:a16="http://schemas.microsoft.com/office/drawing/2014/main" id="{FC974505-5F88-4C68-B044-B90A875A128E}"/>
+                <a16:creationId xmlns:a16="http://schemas.microsoft.com/office/drawing/2014/main" id="{FC974505-5F88-4C68-B044-B90A875A128E}"/>
               </a:ext>
             </a:extLst>
           </p:cNvPr>
@@ -5261,7 +5214,7 @@
           <p:cNvPr id="3" name="Vertical Text Placeholder 2">
             <a:extLst>
               <a:ext uri="{FF2B5EF4-FFF2-40B4-BE49-F238E27FC236}">
-                <a16:creationId xmlns="" xmlns:a16="http://schemas.microsoft.com/office/drawing/2014/main" id="{98154938-180F-400A-A444-2DAC9B404CB0}"/>
+                <a16:creationId xmlns:a16="http://schemas.microsoft.com/office/drawing/2014/main" id="{98154938-180F-400A-A444-2DAC9B404CB0}"/>
               </a:ext>
             </a:extLst>
           </p:cNvPr>
@@ -5324,7 +5277,7 @@
           <p:cNvPr id="4" name="Date Placeholder 3">
             <a:extLst>
               <a:ext uri="{FF2B5EF4-FFF2-40B4-BE49-F238E27FC236}">
-                <a16:creationId xmlns="" xmlns:a16="http://schemas.microsoft.com/office/drawing/2014/main" id="{C744BC1C-22DF-43AD-B4A1-B55EB4C01F8A}"/>
+                <a16:creationId xmlns:a16="http://schemas.microsoft.com/office/drawing/2014/main" id="{C744BC1C-22DF-43AD-B4A1-B55EB4C01F8A}"/>
               </a:ext>
             </a:extLst>
           </p:cNvPr>
@@ -5343,7 +5296,7 @@
             <a:fld id="{C0697723-E498-4D64-BBB6-490ED1364AC9}" type="datetimeFigureOut">
               <a:rPr lang="en-IN" smtClean="0"/>
               <a:pPr/>
-              <a:t>19-10-2024</a:t>
+              <a:t>26-01-2025</a:t>
             </a:fld>
             <a:endParaRPr lang="en-IN"/>
           </a:p>
@@ -5354,7 +5307,7 @@
           <p:cNvPr id="5" name="Footer Placeholder 4">
             <a:extLst>
               <a:ext uri="{FF2B5EF4-FFF2-40B4-BE49-F238E27FC236}">
-                <a16:creationId xmlns="" xmlns:a16="http://schemas.microsoft.com/office/drawing/2014/main" id="{1C439F43-011E-4BE1-A79A-17FE1495CC2F}"/>
+                <a16:creationId xmlns:a16="http://schemas.microsoft.com/office/drawing/2014/main" id="{1C439F43-011E-4BE1-A79A-17FE1495CC2F}"/>
               </a:ext>
             </a:extLst>
           </p:cNvPr>
@@ -5379,7 +5332,7 @@
           <p:cNvPr id="6" name="Slide Number Placeholder 5">
             <a:extLst>
               <a:ext uri="{FF2B5EF4-FFF2-40B4-BE49-F238E27FC236}">
-                <a16:creationId xmlns="" xmlns:a16="http://schemas.microsoft.com/office/drawing/2014/main" id="{A3025448-2680-4648-B696-07B726E5BEA4}"/>
+                <a16:creationId xmlns:a16="http://schemas.microsoft.com/office/drawing/2014/main" id="{A3025448-2680-4648-B696-07B726E5BEA4}"/>
               </a:ext>
             </a:extLst>
           </p:cNvPr>
@@ -5439,7 +5392,7 @@
           <p:cNvPr id="2" name="Title 1">
             <a:extLst>
               <a:ext uri="{FF2B5EF4-FFF2-40B4-BE49-F238E27FC236}">
-                <a16:creationId xmlns="" xmlns:a16="http://schemas.microsoft.com/office/drawing/2014/main" id="{617E7D49-DB18-4481-BBAD-3CCDB0B6E136}"/>
+                <a16:creationId xmlns:a16="http://schemas.microsoft.com/office/drawing/2014/main" id="{617E7D49-DB18-4481-BBAD-3CCDB0B6E136}"/>
               </a:ext>
             </a:extLst>
           </p:cNvPr>
@@ -5468,7 +5421,7 @@
           <p:cNvPr id="3" name="Content Placeholder 2">
             <a:extLst>
               <a:ext uri="{FF2B5EF4-FFF2-40B4-BE49-F238E27FC236}">
-                <a16:creationId xmlns="" xmlns:a16="http://schemas.microsoft.com/office/drawing/2014/main" id="{37B48B0F-E770-4648-80B0-0B9A177348F8}"/>
+                <a16:creationId xmlns:a16="http://schemas.microsoft.com/office/drawing/2014/main" id="{37B48B0F-E770-4648-80B0-0B9A177348F8}"/>
               </a:ext>
             </a:extLst>
           </p:cNvPr>
@@ -5526,7 +5479,7 @@
           <p:cNvPr id="4" name="Date Placeholder 3">
             <a:extLst>
               <a:ext uri="{FF2B5EF4-FFF2-40B4-BE49-F238E27FC236}">
-                <a16:creationId xmlns="" xmlns:a16="http://schemas.microsoft.com/office/drawing/2014/main" id="{8689BBA6-35F4-4C69-B817-8B6D5B3C7F64}"/>
+                <a16:creationId xmlns:a16="http://schemas.microsoft.com/office/drawing/2014/main" id="{8689BBA6-35F4-4C69-B817-8B6D5B3C7F64}"/>
               </a:ext>
             </a:extLst>
           </p:cNvPr>
@@ -5545,7 +5498,7 @@
             <a:fld id="{C0697723-E498-4D64-BBB6-490ED1364AC9}" type="datetimeFigureOut">
               <a:rPr lang="en-IN" smtClean="0"/>
               <a:pPr/>
-              <a:t>19-10-2024</a:t>
+              <a:t>26-01-2025</a:t>
             </a:fld>
             <a:endParaRPr lang="en-IN"/>
           </a:p>
@@ -5556,7 +5509,7 @@
           <p:cNvPr id="5" name="Footer Placeholder 4">
             <a:extLst>
               <a:ext uri="{FF2B5EF4-FFF2-40B4-BE49-F238E27FC236}">
-                <a16:creationId xmlns="" xmlns:a16="http://schemas.microsoft.com/office/drawing/2014/main" id="{1F6B119B-E4E0-4014-B1F1-495E208A0C63}"/>
+                <a16:creationId xmlns:a16="http://schemas.microsoft.com/office/drawing/2014/main" id="{1F6B119B-E4E0-4014-B1F1-495E208A0C63}"/>
               </a:ext>
             </a:extLst>
           </p:cNvPr>
@@ -5581,7 +5534,7 @@
           <p:cNvPr id="6" name="Slide Number Placeholder 5">
             <a:extLst>
               <a:ext uri="{FF2B5EF4-FFF2-40B4-BE49-F238E27FC236}">
-                <a16:creationId xmlns="" xmlns:a16="http://schemas.microsoft.com/office/drawing/2014/main" id="{19B45A5E-AE1B-4A92-B64A-2F8A4786E1A2}"/>
+                <a16:creationId xmlns:a16="http://schemas.microsoft.com/office/drawing/2014/main" id="{19B45A5E-AE1B-4A92-B64A-2F8A4786E1A2}"/>
               </a:ext>
             </a:extLst>
           </p:cNvPr>
@@ -5641,7 +5594,7 @@
           <p:cNvPr id="2" name="Title 1">
             <a:extLst>
               <a:ext uri="{FF2B5EF4-FFF2-40B4-BE49-F238E27FC236}">
-                <a16:creationId xmlns="" xmlns:a16="http://schemas.microsoft.com/office/drawing/2014/main" id="{B208196D-BED0-4BD8-AB4C-B2B3CCC7D5E0}"/>
+                <a16:creationId xmlns:a16="http://schemas.microsoft.com/office/drawing/2014/main" id="{B208196D-BED0-4BD8-AB4C-B2B3CCC7D5E0}"/>
               </a:ext>
             </a:extLst>
           </p:cNvPr>
@@ -5679,7 +5632,7 @@
           <p:cNvPr id="3" name="Text Placeholder 2">
             <a:extLst>
               <a:ext uri="{FF2B5EF4-FFF2-40B4-BE49-F238E27FC236}">
-                <a16:creationId xmlns="" xmlns:a16="http://schemas.microsoft.com/office/drawing/2014/main" id="{0CC613EC-F0A0-4466-A6C2-D28B863D15D2}"/>
+                <a16:creationId xmlns:a16="http://schemas.microsoft.com/office/drawing/2014/main" id="{0CC613EC-F0A0-4466-A6C2-D28B863D15D2}"/>
               </a:ext>
             </a:extLst>
           </p:cNvPr>
@@ -5804,7 +5757,7 @@
           <p:cNvPr id="4" name="Date Placeholder 3">
             <a:extLst>
               <a:ext uri="{FF2B5EF4-FFF2-40B4-BE49-F238E27FC236}">
-                <a16:creationId xmlns="" xmlns:a16="http://schemas.microsoft.com/office/drawing/2014/main" id="{A3CF7A95-22EE-4F22-AEDA-C190D2F87D01}"/>
+                <a16:creationId xmlns:a16="http://schemas.microsoft.com/office/drawing/2014/main" id="{A3CF7A95-22EE-4F22-AEDA-C190D2F87D01}"/>
               </a:ext>
             </a:extLst>
           </p:cNvPr>
@@ -5823,7 +5776,7 @@
             <a:fld id="{C0697723-E498-4D64-BBB6-490ED1364AC9}" type="datetimeFigureOut">
               <a:rPr lang="en-IN" smtClean="0"/>
               <a:pPr/>
-              <a:t>19-10-2024</a:t>
+              <a:t>26-01-2025</a:t>
             </a:fld>
             <a:endParaRPr lang="en-IN"/>
           </a:p>
@@ -5834,7 +5787,7 @@
           <p:cNvPr id="5" name="Footer Placeholder 4">
             <a:extLst>
               <a:ext uri="{FF2B5EF4-FFF2-40B4-BE49-F238E27FC236}">
-                <a16:creationId xmlns="" xmlns:a16="http://schemas.microsoft.com/office/drawing/2014/main" id="{7C385F91-0601-4D65-A3E8-CFDC20A77501}"/>
+                <a16:creationId xmlns:a16="http://schemas.microsoft.com/office/drawing/2014/main" id="{7C385F91-0601-4D65-A3E8-CFDC20A77501}"/>
               </a:ext>
             </a:extLst>
           </p:cNvPr>
@@ -5859,7 +5812,7 @@
           <p:cNvPr id="6" name="Slide Number Placeholder 5">
             <a:extLst>
               <a:ext uri="{FF2B5EF4-FFF2-40B4-BE49-F238E27FC236}">
-                <a16:creationId xmlns="" xmlns:a16="http://schemas.microsoft.com/office/drawing/2014/main" id="{88D0A9F0-9DDE-4015-8C5C-5C9D6B60DDA0}"/>
+                <a16:creationId xmlns:a16="http://schemas.microsoft.com/office/drawing/2014/main" id="{88D0A9F0-9DDE-4015-8C5C-5C9D6B60DDA0}"/>
               </a:ext>
             </a:extLst>
           </p:cNvPr>
@@ -5919,7 +5872,7 @@
           <p:cNvPr id="2" name="Title 1">
             <a:extLst>
               <a:ext uri="{FF2B5EF4-FFF2-40B4-BE49-F238E27FC236}">
-                <a16:creationId xmlns="" xmlns:a16="http://schemas.microsoft.com/office/drawing/2014/main" id="{708E85AF-03C6-4B44-A538-43B0427D31F4}"/>
+                <a16:creationId xmlns:a16="http://schemas.microsoft.com/office/drawing/2014/main" id="{708E85AF-03C6-4B44-A538-43B0427D31F4}"/>
               </a:ext>
             </a:extLst>
           </p:cNvPr>
@@ -5948,7 +5901,7 @@
           <p:cNvPr id="3" name="Content Placeholder 2">
             <a:extLst>
               <a:ext uri="{FF2B5EF4-FFF2-40B4-BE49-F238E27FC236}">
-                <a16:creationId xmlns="" xmlns:a16="http://schemas.microsoft.com/office/drawing/2014/main" id="{83C33EE5-59F6-4A1A-AE1E-8765B2B76361}"/>
+                <a16:creationId xmlns:a16="http://schemas.microsoft.com/office/drawing/2014/main" id="{83C33EE5-59F6-4A1A-AE1E-8765B2B76361}"/>
               </a:ext>
             </a:extLst>
           </p:cNvPr>
@@ -6011,7 +5964,7 @@
           <p:cNvPr id="4" name="Content Placeholder 3">
             <a:extLst>
               <a:ext uri="{FF2B5EF4-FFF2-40B4-BE49-F238E27FC236}">
-                <a16:creationId xmlns="" xmlns:a16="http://schemas.microsoft.com/office/drawing/2014/main" id="{1D9D6861-A242-46E3-9BF3-A0C8A8DBB45B}"/>
+                <a16:creationId xmlns:a16="http://schemas.microsoft.com/office/drawing/2014/main" id="{1D9D6861-A242-46E3-9BF3-A0C8A8DBB45B}"/>
               </a:ext>
             </a:extLst>
           </p:cNvPr>
@@ -6074,7 +6027,7 @@
           <p:cNvPr id="5" name="Date Placeholder 4">
             <a:extLst>
               <a:ext uri="{FF2B5EF4-FFF2-40B4-BE49-F238E27FC236}">
-                <a16:creationId xmlns="" xmlns:a16="http://schemas.microsoft.com/office/drawing/2014/main" id="{6A9D4037-319B-46C2-9889-B7EE91425689}"/>
+                <a16:creationId xmlns:a16="http://schemas.microsoft.com/office/drawing/2014/main" id="{6A9D4037-319B-46C2-9889-B7EE91425689}"/>
               </a:ext>
             </a:extLst>
           </p:cNvPr>
@@ -6093,7 +6046,7 @@
             <a:fld id="{C0697723-E498-4D64-BBB6-490ED1364AC9}" type="datetimeFigureOut">
               <a:rPr lang="en-IN" smtClean="0"/>
               <a:pPr/>
-              <a:t>19-10-2024</a:t>
+              <a:t>26-01-2025</a:t>
             </a:fld>
             <a:endParaRPr lang="en-IN"/>
           </a:p>
@@ -6104,7 +6057,7 @@
           <p:cNvPr id="6" name="Footer Placeholder 5">
             <a:extLst>
               <a:ext uri="{FF2B5EF4-FFF2-40B4-BE49-F238E27FC236}">
-                <a16:creationId xmlns="" xmlns:a16="http://schemas.microsoft.com/office/drawing/2014/main" id="{C1EE4E15-6B43-42E0-9689-9D809E7745C4}"/>
+                <a16:creationId xmlns:a16="http://schemas.microsoft.com/office/drawing/2014/main" id="{C1EE4E15-6B43-42E0-9689-9D809E7745C4}"/>
               </a:ext>
             </a:extLst>
           </p:cNvPr>
@@ -6129,7 +6082,7 @@
           <p:cNvPr id="7" name="Slide Number Placeholder 6">
             <a:extLst>
               <a:ext uri="{FF2B5EF4-FFF2-40B4-BE49-F238E27FC236}">
-                <a16:creationId xmlns="" xmlns:a16="http://schemas.microsoft.com/office/drawing/2014/main" id="{9E5B8A2C-7787-42C7-9053-9FAC49800765}"/>
+                <a16:creationId xmlns:a16="http://schemas.microsoft.com/office/drawing/2014/main" id="{9E5B8A2C-7787-42C7-9053-9FAC49800765}"/>
               </a:ext>
             </a:extLst>
           </p:cNvPr>
@@ -6189,7 +6142,7 @@
           <p:cNvPr id="2" name="Title 1">
             <a:extLst>
               <a:ext uri="{FF2B5EF4-FFF2-40B4-BE49-F238E27FC236}">
-                <a16:creationId xmlns="" xmlns:a16="http://schemas.microsoft.com/office/drawing/2014/main" id="{13FD7F82-17CF-402C-A83C-9BB0B0450C87}"/>
+                <a16:creationId xmlns:a16="http://schemas.microsoft.com/office/drawing/2014/main" id="{13FD7F82-17CF-402C-A83C-9BB0B0450C87}"/>
               </a:ext>
             </a:extLst>
           </p:cNvPr>
@@ -6223,7 +6176,7 @@
           <p:cNvPr id="3" name="Text Placeholder 2">
             <a:extLst>
               <a:ext uri="{FF2B5EF4-FFF2-40B4-BE49-F238E27FC236}">
-                <a16:creationId xmlns="" xmlns:a16="http://schemas.microsoft.com/office/drawing/2014/main" id="{AD6925B8-18E2-4648-9C7D-9A50568E686B}"/>
+                <a16:creationId xmlns:a16="http://schemas.microsoft.com/office/drawing/2014/main" id="{AD6925B8-18E2-4648-9C7D-9A50568E686B}"/>
               </a:ext>
             </a:extLst>
           </p:cNvPr>
@@ -6294,7 +6247,7 @@
           <p:cNvPr id="4" name="Content Placeholder 3">
             <a:extLst>
               <a:ext uri="{FF2B5EF4-FFF2-40B4-BE49-F238E27FC236}">
-                <a16:creationId xmlns="" xmlns:a16="http://schemas.microsoft.com/office/drawing/2014/main" id="{63ECAC91-5516-49CF-ABB2-BDCA1101D993}"/>
+                <a16:creationId xmlns:a16="http://schemas.microsoft.com/office/drawing/2014/main" id="{63ECAC91-5516-49CF-ABB2-BDCA1101D993}"/>
               </a:ext>
             </a:extLst>
           </p:cNvPr>
@@ -6357,7 +6310,7 @@
           <p:cNvPr id="5" name="Text Placeholder 4">
             <a:extLst>
               <a:ext uri="{FF2B5EF4-FFF2-40B4-BE49-F238E27FC236}">
-                <a16:creationId xmlns="" xmlns:a16="http://schemas.microsoft.com/office/drawing/2014/main" id="{A13B518C-5424-4D17-AE61-73B5540B3F5C}"/>
+                <a16:creationId xmlns:a16="http://schemas.microsoft.com/office/drawing/2014/main" id="{A13B518C-5424-4D17-AE61-73B5540B3F5C}"/>
               </a:ext>
             </a:extLst>
           </p:cNvPr>
@@ -6428,7 +6381,7 @@
           <p:cNvPr id="6" name="Content Placeholder 5">
             <a:extLst>
               <a:ext uri="{FF2B5EF4-FFF2-40B4-BE49-F238E27FC236}">
-                <a16:creationId xmlns="" xmlns:a16="http://schemas.microsoft.com/office/drawing/2014/main" id="{7418E488-5143-4637-878A-8024B768B637}"/>
+                <a16:creationId xmlns:a16="http://schemas.microsoft.com/office/drawing/2014/main" id="{7418E488-5143-4637-878A-8024B768B637}"/>
               </a:ext>
             </a:extLst>
           </p:cNvPr>
@@ -6491,7 +6444,7 @@
           <p:cNvPr id="7" name="Date Placeholder 6">
             <a:extLst>
               <a:ext uri="{FF2B5EF4-FFF2-40B4-BE49-F238E27FC236}">
-                <a16:creationId xmlns="" xmlns:a16="http://schemas.microsoft.com/office/drawing/2014/main" id="{12F92FE0-EADD-43E3-B191-7F6FEA9C81E6}"/>
+                <a16:creationId xmlns:a16="http://schemas.microsoft.com/office/drawing/2014/main" id="{12F92FE0-EADD-43E3-B191-7F6FEA9C81E6}"/>
               </a:ext>
             </a:extLst>
           </p:cNvPr>
@@ -6510,7 +6463,7 @@
             <a:fld id="{C0697723-E498-4D64-BBB6-490ED1364AC9}" type="datetimeFigureOut">
               <a:rPr lang="en-IN" smtClean="0"/>
               <a:pPr/>
-              <a:t>19-10-2024</a:t>
+              <a:t>26-01-2025</a:t>
             </a:fld>
             <a:endParaRPr lang="en-IN"/>
           </a:p>
@@ -6521,7 +6474,7 @@
           <p:cNvPr id="8" name="Footer Placeholder 7">
             <a:extLst>
               <a:ext uri="{FF2B5EF4-FFF2-40B4-BE49-F238E27FC236}">
-                <a16:creationId xmlns="" xmlns:a16="http://schemas.microsoft.com/office/drawing/2014/main" id="{FD4604E9-CD41-4846-B48F-03B22B3709D6}"/>
+                <a16:creationId xmlns:a16="http://schemas.microsoft.com/office/drawing/2014/main" id="{FD4604E9-CD41-4846-B48F-03B22B3709D6}"/>
               </a:ext>
             </a:extLst>
           </p:cNvPr>
@@ -6546,7 +6499,7 @@
           <p:cNvPr id="9" name="Slide Number Placeholder 8">
             <a:extLst>
               <a:ext uri="{FF2B5EF4-FFF2-40B4-BE49-F238E27FC236}">
-                <a16:creationId xmlns="" xmlns:a16="http://schemas.microsoft.com/office/drawing/2014/main" id="{5AFE060F-933B-49D3-8FF3-B0DEF9DC6484}"/>
+                <a16:creationId xmlns:a16="http://schemas.microsoft.com/office/drawing/2014/main" id="{5AFE060F-933B-49D3-8FF3-B0DEF9DC6484}"/>
               </a:ext>
             </a:extLst>
           </p:cNvPr>
@@ -6606,7 +6559,7 @@
           <p:cNvPr id="2" name="Title 1">
             <a:extLst>
               <a:ext uri="{FF2B5EF4-FFF2-40B4-BE49-F238E27FC236}">
-                <a16:creationId xmlns="" xmlns:a16="http://schemas.microsoft.com/office/drawing/2014/main" id="{72D133CA-B572-4BA7-A189-A42C96F1089A}"/>
+                <a16:creationId xmlns:a16="http://schemas.microsoft.com/office/drawing/2014/main" id="{72D133CA-B572-4BA7-A189-A42C96F1089A}"/>
               </a:ext>
             </a:extLst>
           </p:cNvPr>
@@ -6635,7 +6588,7 @@
           <p:cNvPr id="3" name="Date Placeholder 2">
             <a:extLst>
               <a:ext uri="{FF2B5EF4-FFF2-40B4-BE49-F238E27FC236}">
-                <a16:creationId xmlns="" xmlns:a16="http://schemas.microsoft.com/office/drawing/2014/main" id="{28BA2B92-6276-46C5-8418-926229142AF0}"/>
+                <a16:creationId xmlns:a16="http://schemas.microsoft.com/office/drawing/2014/main" id="{28BA2B92-6276-46C5-8418-926229142AF0}"/>
               </a:ext>
             </a:extLst>
           </p:cNvPr>
@@ -6654,7 +6607,7 @@
             <a:fld id="{C0697723-E498-4D64-BBB6-490ED1364AC9}" type="datetimeFigureOut">
               <a:rPr lang="en-IN" smtClean="0"/>
               <a:pPr/>
-              <a:t>19-10-2024</a:t>
+              <a:t>26-01-2025</a:t>
             </a:fld>
             <a:endParaRPr lang="en-IN"/>
           </a:p>
@@ -6665,7 +6618,7 @@
           <p:cNvPr id="4" name="Footer Placeholder 3">
             <a:extLst>
               <a:ext uri="{FF2B5EF4-FFF2-40B4-BE49-F238E27FC236}">
-                <a16:creationId xmlns="" xmlns:a16="http://schemas.microsoft.com/office/drawing/2014/main" id="{ADC7E3F1-B21B-41C5-BFFE-A0D23D01EE20}"/>
+                <a16:creationId xmlns:a16="http://schemas.microsoft.com/office/drawing/2014/main" id="{ADC7E3F1-B21B-41C5-BFFE-A0D23D01EE20}"/>
               </a:ext>
             </a:extLst>
           </p:cNvPr>
@@ -6690,7 +6643,7 @@
           <p:cNvPr id="5" name="Slide Number Placeholder 4">
             <a:extLst>
               <a:ext uri="{FF2B5EF4-FFF2-40B4-BE49-F238E27FC236}">
-                <a16:creationId xmlns="" xmlns:a16="http://schemas.microsoft.com/office/drawing/2014/main" id="{A033B9AF-625C-4788-81E5-2B790AE33D0F}"/>
+                <a16:creationId xmlns:a16="http://schemas.microsoft.com/office/drawing/2014/main" id="{A033B9AF-625C-4788-81E5-2B790AE33D0F}"/>
               </a:ext>
             </a:extLst>
           </p:cNvPr>
@@ -6750,7 +6703,7 @@
           <p:cNvPr id="2" name="Date Placeholder 1">
             <a:extLst>
               <a:ext uri="{FF2B5EF4-FFF2-40B4-BE49-F238E27FC236}">
-                <a16:creationId xmlns="" xmlns:a16="http://schemas.microsoft.com/office/drawing/2014/main" id="{7034E3B9-7089-4D8E-9F92-ED9350E73E40}"/>
+                <a16:creationId xmlns:a16="http://schemas.microsoft.com/office/drawing/2014/main" id="{7034E3B9-7089-4D8E-9F92-ED9350E73E40}"/>
               </a:ext>
             </a:extLst>
           </p:cNvPr>
@@ -6769,7 +6722,7 @@
             <a:fld id="{C0697723-E498-4D64-BBB6-490ED1364AC9}" type="datetimeFigureOut">
               <a:rPr lang="en-IN" smtClean="0"/>
               <a:pPr/>
-              <a:t>19-10-2024</a:t>
+              <a:t>26-01-2025</a:t>
             </a:fld>
             <a:endParaRPr lang="en-IN"/>
           </a:p>
@@ -6780,7 +6733,7 @@
           <p:cNvPr id="3" name="Footer Placeholder 2">
             <a:extLst>
               <a:ext uri="{FF2B5EF4-FFF2-40B4-BE49-F238E27FC236}">
-                <a16:creationId xmlns="" xmlns:a16="http://schemas.microsoft.com/office/drawing/2014/main" id="{C85D6F49-DBB0-4783-8669-C7B8A7030AFD}"/>
+                <a16:creationId xmlns:a16="http://schemas.microsoft.com/office/drawing/2014/main" id="{C85D6F49-DBB0-4783-8669-C7B8A7030AFD}"/>
               </a:ext>
             </a:extLst>
           </p:cNvPr>
@@ -6805,7 +6758,7 @@
           <p:cNvPr id="4" name="Slide Number Placeholder 3">
             <a:extLst>
               <a:ext uri="{FF2B5EF4-FFF2-40B4-BE49-F238E27FC236}">
-                <a16:creationId xmlns="" xmlns:a16="http://schemas.microsoft.com/office/drawing/2014/main" id="{68775C0C-F413-41B7-B055-646B0BFD3A09}"/>
+                <a16:creationId xmlns:a16="http://schemas.microsoft.com/office/drawing/2014/main" id="{68775C0C-F413-41B7-B055-646B0BFD3A09}"/>
               </a:ext>
             </a:extLst>
           </p:cNvPr>
@@ -6865,7 +6818,7 @@
           <p:cNvPr id="2" name="Title 1">
             <a:extLst>
               <a:ext uri="{FF2B5EF4-FFF2-40B4-BE49-F238E27FC236}">
-                <a16:creationId xmlns="" xmlns:a16="http://schemas.microsoft.com/office/drawing/2014/main" id="{0525262E-9CC6-4471-87B5-E96BB4A83927}"/>
+                <a16:creationId xmlns:a16="http://schemas.microsoft.com/office/drawing/2014/main" id="{0525262E-9CC6-4471-87B5-E96BB4A83927}"/>
               </a:ext>
             </a:extLst>
           </p:cNvPr>
@@ -6903,7 +6856,7 @@
           <p:cNvPr id="3" name="Content Placeholder 2">
             <a:extLst>
               <a:ext uri="{FF2B5EF4-FFF2-40B4-BE49-F238E27FC236}">
-                <a16:creationId xmlns="" xmlns:a16="http://schemas.microsoft.com/office/drawing/2014/main" id="{CC85306A-CD4B-46EE-9161-2B0A130F2AF4}"/>
+                <a16:creationId xmlns:a16="http://schemas.microsoft.com/office/drawing/2014/main" id="{CC85306A-CD4B-46EE-9161-2B0A130F2AF4}"/>
               </a:ext>
             </a:extLst>
           </p:cNvPr>
@@ -6994,7 +6947,7 @@
           <p:cNvPr id="4" name="Text Placeholder 3">
             <a:extLst>
               <a:ext uri="{FF2B5EF4-FFF2-40B4-BE49-F238E27FC236}">
-                <a16:creationId xmlns="" xmlns:a16="http://schemas.microsoft.com/office/drawing/2014/main" id="{17A59BE6-9514-4D99-A003-32E53BEDF6F1}"/>
+                <a16:creationId xmlns:a16="http://schemas.microsoft.com/office/drawing/2014/main" id="{17A59BE6-9514-4D99-A003-32E53BEDF6F1}"/>
               </a:ext>
             </a:extLst>
           </p:cNvPr>
@@ -7065,7 +7018,7 @@
           <p:cNvPr id="5" name="Date Placeholder 4">
             <a:extLst>
               <a:ext uri="{FF2B5EF4-FFF2-40B4-BE49-F238E27FC236}">
-                <a16:creationId xmlns="" xmlns:a16="http://schemas.microsoft.com/office/drawing/2014/main" id="{051144FC-DE55-4C66-B467-EE320664508C}"/>
+                <a16:creationId xmlns:a16="http://schemas.microsoft.com/office/drawing/2014/main" id="{051144FC-DE55-4C66-B467-EE320664508C}"/>
               </a:ext>
             </a:extLst>
           </p:cNvPr>
@@ -7084,7 +7037,7 @@
             <a:fld id="{C0697723-E498-4D64-BBB6-490ED1364AC9}" type="datetimeFigureOut">
               <a:rPr lang="en-IN" smtClean="0"/>
               <a:pPr/>
-              <a:t>19-10-2024</a:t>
+              <a:t>26-01-2025</a:t>
             </a:fld>
             <a:endParaRPr lang="en-IN"/>
           </a:p>
@@ -7095,7 +7048,7 @@
           <p:cNvPr id="6" name="Footer Placeholder 5">
             <a:extLst>
               <a:ext uri="{FF2B5EF4-FFF2-40B4-BE49-F238E27FC236}">
-                <a16:creationId xmlns="" xmlns:a16="http://schemas.microsoft.com/office/drawing/2014/main" id="{7ABC472B-5E7F-485E-A706-89B79D412CBF}"/>
+                <a16:creationId xmlns:a16="http://schemas.microsoft.com/office/drawing/2014/main" id="{7ABC472B-5E7F-485E-A706-89B79D412CBF}"/>
               </a:ext>
             </a:extLst>
           </p:cNvPr>
@@ -7120,7 +7073,7 @@
           <p:cNvPr id="7" name="Slide Number Placeholder 6">
             <a:extLst>
               <a:ext uri="{FF2B5EF4-FFF2-40B4-BE49-F238E27FC236}">
-                <a16:creationId xmlns="" xmlns:a16="http://schemas.microsoft.com/office/drawing/2014/main" id="{7556C44B-3BC6-40D9-94ED-B0796F8E1329}"/>
+                <a16:creationId xmlns:a16="http://schemas.microsoft.com/office/drawing/2014/main" id="{7556C44B-3BC6-40D9-94ED-B0796F8E1329}"/>
               </a:ext>
             </a:extLst>
           </p:cNvPr>
@@ -7180,7 +7133,7 @@
           <p:cNvPr id="2" name="Title 1">
             <a:extLst>
               <a:ext uri="{FF2B5EF4-FFF2-40B4-BE49-F238E27FC236}">
-                <a16:creationId xmlns="" xmlns:a16="http://schemas.microsoft.com/office/drawing/2014/main" id="{CA759C2A-444C-4E85-BF34-29BD3E3F6DFF}"/>
+                <a16:creationId xmlns:a16="http://schemas.microsoft.com/office/drawing/2014/main" id="{CA759C2A-444C-4E85-BF34-29BD3E3F6DFF}"/>
               </a:ext>
             </a:extLst>
           </p:cNvPr>
@@ -7218,7 +7171,7 @@
           <p:cNvPr id="3" name="Picture Placeholder 2">
             <a:extLst>
               <a:ext uri="{FF2B5EF4-FFF2-40B4-BE49-F238E27FC236}">
-                <a16:creationId xmlns="" xmlns:a16="http://schemas.microsoft.com/office/drawing/2014/main" id="{4B688350-F59A-41DF-B2EF-F9EEA2470087}"/>
+                <a16:creationId xmlns:a16="http://schemas.microsoft.com/office/drawing/2014/main" id="{4B688350-F59A-41DF-B2EF-F9EEA2470087}"/>
               </a:ext>
             </a:extLst>
           </p:cNvPr>
@@ -7285,7 +7238,7 @@
           <p:cNvPr id="4" name="Text Placeholder 3">
             <a:extLst>
               <a:ext uri="{FF2B5EF4-FFF2-40B4-BE49-F238E27FC236}">
-                <a16:creationId xmlns="" xmlns:a16="http://schemas.microsoft.com/office/drawing/2014/main" id="{AC5D8DC2-A933-46C8-BE16-322CE1A3EC74}"/>
+                <a16:creationId xmlns:a16="http://schemas.microsoft.com/office/drawing/2014/main" id="{AC5D8DC2-A933-46C8-BE16-322CE1A3EC74}"/>
               </a:ext>
             </a:extLst>
           </p:cNvPr>
@@ -7356,7 +7309,7 @@
           <p:cNvPr id="5" name="Date Placeholder 4">
             <a:extLst>
               <a:ext uri="{FF2B5EF4-FFF2-40B4-BE49-F238E27FC236}">
-                <a16:creationId xmlns="" xmlns:a16="http://schemas.microsoft.com/office/drawing/2014/main" id="{2D17E0BD-405F-407D-AAE8-84A2C67291BD}"/>
+                <a16:creationId xmlns:a16="http://schemas.microsoft.com/office/drawing/2014/main" id="{2D17E0BD-405F-407D-AAE8-84A2C67291BD}"/>
               </a:ext>
             </a:extLst>
           </p:cNvPr>
@@ -7375,7 +7328,7 @@
             <a:fld id="{C0697723-E498-4D64-BBB6-490ED1364AC9}" type="datetimeFigureOut">
               <a:rPr lang="en-IN" smtClean="0"/>
               <a:pPr/>
-              <a:t>19-10-2024</a:t>
+              <a:t>26-01-2025</a:t>
             </a:fld>
             <a:endParaRPr lang="en-IN"/>
           </a:p>
@@ -7386,7 +7339,7 @@
           <p:cNvPr id="6" name="Footer Placeholder 5">
             <a:extLst>
               <a:ext uri="{FF2B5EF4-FFF2-40B4-BE49-F238E27FC236}">
-                <a16:creationId xmlns="" xmlns:a16="http://schemas.microsoft.com/office/drawing/2014/main" id="{F5294B3E-2DAE-4C72-9B6F-EE43965DA9DB}"/>
+                <a16:creationId xmlns:a16="http://schemas.microsoft.com/office/drawing/2014/main" id="{F5294B3E-2DAE-4C72-9B6F-EE43965DA9DB}"/>
               </a:ext>
             </a:extLst>
           </p:cNvPr>
@@ -7411,7 +7364,7 @@
           <p:cNvPr id="7" name="Slide Number Placeholder 6">
             <a:extLst>
               <a:ext uri="{FF2B5EF4-FFF2-40B4-BE49-F238E27FC236}">
-                <a16:creationId xmlns="" xmlns:a16="http://schemas.microsoft.com/office/drawing/2014/main" id="{5474055D-9410-4E28-8C54-90B4F6E7DBFF}"/>
+                <a16:creationId xmlns:a16="http://schemas.microsoft.com/office/drawing/2014/main" id="{5474055D-9410-4E28-8C54-90B4F6E7DBFF}"/>
               </a:ext>
             </a:extLst>
           </p:cNvPr>
@@ -7476,7 +7429,7 @@
           <p:cNvPr id="2" name="Title Placeholder 1">
             <a:extLst>
               <a:ext uri="{FF2B5EF4-FFF2-40B4-BE49-F238E27FC236}">
-                <a16:creationId xmlns="" xmlns:a16="http://schemas.microsoft.com/office/drawing/2014/main" id="{9449A4AD-9C61-4A2F-99E0-675E3359267C}"/>
+                <a16:creationId xmlns:a16="http://schemas.microsoft.com/office/drawing/2014/main" id="{9449A4AD-9C61-4A2F-99E0-675E3359267C}"/>
               </a:ext>
             </a:extLst>
           </p:cNvPr>
@@ -7515,7 +7468,7 @@
           <p:cNvPr id="3" name="Text Placeholder 2">
             <a:extLst>
               <a:ext uri="{FF2B5EF4-FFF2-40B4-BE49-F238E27FC236}">
-                <a16:creationId xmlns="" xmlns:a16="http://schemas.microsoft.com/office/drawing/2014/main" id="{A10F732A-189B-4AC1-886A-23584A50B846}"/>
+                <a16:creationId xmlns:a16="http://schemas.microsoft.com/office/drawing/2014/main" id="{A10F732A-189B-4AC1-886A-23584A50B846}"/>
               </a:ext>
             </a:extLst>
           </p:cNvPr>
@@ -7583,7 +7536,7 @@
           <p:cNvPr id="4" name="Date Placeholder 3">
             <a:extLst>
               <a:ext uri="{FF2B5EF4-FFF2-40B4-BE49-F238E27FC236}">
-                <a16:creationId xmlns="" xmlns:a16="http://schemas.microsoft.com/office/drawing/2014/main" id="{D5F3EE23-AF03-4903-9219-60875A711FC4}"/>
+                <a16:creationId xmlns:a16="http://schemas.microsoft.com/office/drawing/2014/main" id="{D5F3EE23-AF03-4903-9219-60875A711FC4}"/>
               </a:ext>
             </a:extLst>
           </p:cNvPr>
@@ -7620,7 +7573,7 @@
             <a:fld id="{C0697723-E498-4D64-BBB6-490ED1364AC9}" type="datetimeFigureOut">
               <a:rPr lang="en-IN" smtClean="0"/>
               <a:pPr/>
-              <a:t>19-10-2024</a:t>
+              <a:t>26-01-2025</a:t>
             </a:fld>
             <a:endParaRPr lang="en-IN"/>
           </a:p>
@@ -7631,7 +7584,7 @@
           <p:cNvPr id="5" name="Footer Placeholder 4">
             <a:extLst>
               <a:ext uri="{FF2B5EF4-FFF2-40B4-BE49-F238E27FC236}">
-                <a16:creationId xmlns="" xmlns:a16="http://schemas.microsoft.com/office/drawing/2014/main" id="{957FC4B0-FF26-4AB9-BACD-041A24DCD298}"/>
+                <a16:creationId xmlns:a16="http://schemas.microsoft.com/office/drawing/2014/main" id="{957FC4B0-FF26-4AB9-BACD-041A24DCD298}"/>
               </a:ext>
             </a:extLst>
           </p:cNvPr>
@@ -7674,7 +7627,7 @@
           <p:cNvPr id="6" name="Slide Number Placeholder 5">
             <a:extLst>
               <a:ext uri="{FF2B5EF4-FFF2-40B4-BE49-F238E27FC236}">
-                <a16:creationId xmlns="" xmlns:a16="http://schemas.microsoft.com/office/drawing/2014/main" id="{F4C8E684-F46A-48CC-BAD8-663F8E1173CA}"/>
+                <a16:creationId xmlns:a16="http://schemas.microsoft.com/office/drawing/2014/main" id="{F4C8E684-F46A-48CC-BAD8-663F8E1173CA}"/>
               </a:ext>
             </a:extLst>
           </p:cNvPr>
@@ -8043,7 +7996,7 @@
           <p:cNvPr id="14" name="Straight Connector 13">
             <a:extLst>
               <a:ext uri="{FF2B5EF4-FFF2-40B4-BE49-F238E27FC236}">
-                <a16:creationId xmlns="" xmlns:a16="http://schemas.microsoft.com/office/drawing/2014/main" id="{44FD96A8-0571-4828-AA94-7DB93A4857C5}"/>
+                <a16:creationId xmlns:a16="http://schemas.microsoft.com/office/drawing/2014/main" id="{44FD96A8-0571-4828-AA94-7DB93A4857C5}"/>
               </a:ext>
             </a:extLst>
           </p:cNvPr>
@@ -8086,7 +8039,7 @@
           <p:cNvPr id="17" name="Rectangle 16">
             <a:extLst>
               <a:ext uri="{FF2B5EF4-FFF2-40B4-BE49-F238E27FC236}">
-                <a16:creationId xmlns="" xmlns:a16="http://schemas.microsoft.com/office/drawing/2014/main" id="{62AC1A6C-10C2-4695-9224-09DA1B0D5932}"/>
+                <a16:creationId xmlns:a16="http://schemas.microsoft.com/office/drawing/2014/main" id="{62AC1A6C-10C2-4695-9224-09DA1B0D5932}"/>
               </a:ext>
             </a:extLst>
           </p:cNvPr>
@@ -8121,7 +8074,7 @@
           <p:cNvPr id="23" name="Group 22">
             <a:extLst>
               <a:ext uri="{FF2B5EF4-FFF2-40B4-BE49-F238E27FC236}">
-                <a16:creationId xmlns="" xmlns:a16="http://schemas.microsoft.com/office/drawing/2014/main" id="{6DD8DCC0-549E-48DB-8CCA-E3FF8FBDEBF0}"/>
+                <a16:creationId xmlns:a16="http://schemas.microsoft.com/office/drawing/2014/main" id="{6DD8DCC0-549E-48DB-8CCA-E3FF8FBDEBF0}"/>
               </a:ext>
             </a:extLst>
           </p:cNvPr>
@@ -8147,7 +8100,7 @@
             <p:cNvPr id="24" name="Rectangle 23">
               <a:extLst>
                 <a:ext uri="{FF2B5EF4-FFF2-40B4-BE49-F238E27FC236}">
-                  <a16:creationId xmlns="" xmlns:a16="http://schemas.microsoft.com/office/drawing/2014/main" id="{B895392A-2454-40A6-9F7C-BC20D3A463EB}"/>
+                  <a16:creationId xmlns:a16="http://schemas.microsoft.com/office/drawing/2014/main" id="{B895392A-2454-40A6-9F7C-BC20D3A463EB}"/>
                 </a:ext>
               </a:extLst>
             </p:cNvPr>
@@ -8197,7 +8150,7 @@
             <p:cNvPr id="25" name="Rectangle 24">
               <a:extLst>
                 <a:ext uri="{FF2B5EF4-FFF2-40B4-BE49-F238E27FC236}">
-                  <a16:creationId xmlns="" xmlns:a16="http://schemas.microsoft.com/office/drawing/2014/main" id="{DC7604FF-DE88-44B6-A0D9-723028500B8B}"/>
+                  <a16:creationId xmlns:a16="http://schemas.microsoft.com/office/drawing/2014/main" id="{DC7604FF-DE88-44B6-A0D9-723028500B8B}"/>
                 </a:ext>
               </a:extLst>
             </p:cNvPr>
@@ -8247,7 +8200,7 @@
             <p:cNvPr id="26" name="Rectangle 25">
               <a:extLst>
                 <a:ext uri="{FF2B5EF4-FFF2-40B4-BE49-F238E27FC236}">
-                  <a16:creationId xmlns="" xmlns:a16="http://schemas.microsoft.com/office/drawing/2014/main" id="{35F4DC18-13F2-43D2-9B15-157998AF1875}"/>
+                  <a16:creationId xmlns:a16="http://schemas.microsoft.com/office/drawing/2014/main" id="{35F4DC18-13F2-43D2-9B15-157998AF1875}"/>
                 </a:ext>
               </a:extLst>
             </p:cNvPr>
@@ -8297,7 +8250,7 @@
             <p:cNvPr id="27" name="Rectangle 26">
               <a:extLst>
                 <a:ext uri="{FF2B5EF4-FFF2-40B4-BE49-F238E27FC236}">
-                  <a16:creationId xmlns="" xmlns:a16="http://schemas.microsoft.com/office/drawing/2014/main" id="{34375A76-1BF8-4628-B0FE-78E1BEB569B2}"/>
+                  <a16:creationId xmlns:a16="http://schemas.microsoft.com/office/drawing/2014/main" id="{34375A76-1BF8-4628-B0FE-78E1BEB569B2}"/>
                 </a:ext>
               </a:extLst>
             </p:cNvPr>
@@ -8348,7 +8301,7 @@
           <p:cNvPr id="15" name="Rectangle 14">
             <a:extLst>
               <a:ext uri="{FF2B5EF4-FFF2-40B4-BE49-F238E27FC236}">
-                <a16:creationId xmlns="" xmlns:a16="http://schemas.microsoft.com/office/drawing/2014/main" id="{43211A6E-71CA-46AC-B929-E502AF599D76}"/>
+                <a16:creationId xmlns:a16="http://schemas.microsoft.com/office/drawing/2014/main" id="{43211A6E-71CA-46AC-B929-E502AF599D76}"/>
               </a:ext>
             </a:extLst>
           </p:cNvPr>
@@ -8371,7 +8324,7 @@
           <a:lstStyle/>
           <a:p>
             <a:r>
-              <a:rPr lang="en-US" sz="3600" b="1" dirty="0" smtClean="0">
+              <a:rPr lang="en-US" sz="3600" b="1" dirty="0">
                 <a:solidFill>
                   <a:schemeClr val="accent2">
                     <a:lumMod val="75000"/>
@@ -8567,7 +8520,7 @@
           <p:cNvPr id="22" name="Rectangle 21">
             <a:extLst>
               <a:ext uri="{FF2B5EF4-FFF2-40B4-BE49-F238E27FC236}">
-                <a16:creationId xmlns="" xmlns:a16="http://schemas.microsoft.com/office/drawing/2014/main" id="{620A7DEA-950C-4954-B3B7-2672370FABF4}"/>
+                <a16:creationId xmlns:a16="http://schemas.microsoft.com/office/drawing/2014/main" id="{620A7DEA-950C-4954-B3B7-2672370FABF4}"/>
               </a:ext>
             </a:extLst>
           </p:cNvPr>
@@ -8590,13 +8543,13 @@
           <a:lstStyle/>
           <a:p>
             <a:r>
-              <a:rPr lang="en-US" sz="3600" b="1" dirty="0" smtClean="0"/>
+              <a:rPr lang="en-US" sz="3600" b="1" dirty="0"/>
               <a:t>ENGINEERING CHEMISTRY </a:t>
             </a:r>
           </a:p>
           <a:p>
             <a:r>
-              <a:rPr lang="en-IN" sz="2400" b="1" dirty="0" smtClean="0">
+              <a:rPr lang="en-IN" sz="2400" b="1" dirty="0">
                 <a:solidFill>
                   <a:srgbClr val="C00000"/>
                 </a:solidFill>
@@ -8606,7 +8559,7 @@
               <a:t>Module I- </a:t>
             </a:r>
             <a:r>
-              <a:rPr lang="en-US" sz="2400" b="1" dirty="0" smtClean="0">
+              <a:rPr lang="en-US" sz="2400" b="1" dirty="0">
                 <a:solidFill>
                   <a:srgbClr val="C00000"/>
                 </a:solidFill>
@@ -8628,7 +8581,7 @@
           <p:cNvPr id="8" name="Straight Connector 7">
             <a:extLst>
               <a:ext uri="{FF2B5EF4-FFF2-40B4-BE49-F238E27FC236}">
-                <a16:creationId xmlns="" xmlns:a16="http://schemas.microsoft.com/office/drawing/2014/main" id="{A4293697-6E2C-4331-B4E1-C58B355192F4}"/>
+                <a16:creationId xmlns:a16="http://schemas.microsoft.com/office/drawing/2014/main" id="{A4293697-6E2C-4331-B4E1-C58B355192F4}"/>
               </a:ext>
             </a:extLst>
           </p:cNvPr>
@@ -8697,7 +8650,7 @@
           <p:cNvPr id="5" name="Content Placeholder 2">
             <a:extLst>
               <a:ext uri="{FF2B5EF4-FFF2-40B4-BE49-F238E27FC236}">
-                <a16:creationId xmlns="" xmlns:a16="http://schemas.microsoft.com/office/drawing/2014/main" id="{19DFBF62-4FD8-23E9-70BD-B9256800FCDC}"/>
+                <a16:creationId xmlns:a16="http://schemas.microsoft.com/office/drawing/2014/main" id="{19DFBF62-4FD8-23E9-70BD-B9256800FCDC}"/>
               </a:ext>
             </a:extLst>
           </p:cNvPr>
@@ -8768,7 +8721,7 @@
           <p:cNvPr id="6" name="Table 5">
             <a:extLst>
               <a:ext uri="{FF2B5EF4-FFF2-40B4-BE49-F238E27FC236}">
-                <a16:creationId xmlns:mc="http://schemas.openxmlformats.org/markup-compatibility/2006" xmlns:a14="http://schemas.microsoft.com/office/drawing/2010/main" xmlns="" xmlns:a16="http://schemas.microsoft.com/office/drawing/2014/main" id="{6E4C2033-B602-2790-BA60-0EDDDFF63D39}"/>
+                <a16:creationId xmlns:a16="http://schemas.microsoft.com/office/drawing/2014/main" id="{6E4C2033-B602-2790-BA60-0EDDDFF63D39}"/>
               </a:ext>
             </a:extLst>
           </p:cNvPr>
@@ -8797,14 +8750,14 @@
                 <a:gridCol w="5487959">
                   <a:extLst>
                     <a:ext uri="{9D8B030D-6E8A-4147-A177-3AD203B41FA5}">
-                      <a16:colId xmlns:mc="http://schemas.openxmlformats.org/markup-compatibility/2006" xmlns:a14="http://schemas.microsoft.com/office/drawing/2010/main" xmlns="" xmlns:a16="http://schemas.microsoft.com/office/drawing/2014/main" val="1382274334"/>
+                      <a16:colId xmlns:a16="http://schemas.microsoft.com/office/drawing/2014/main" val="1382274334"/>
                     </a:ext>
                   </a:extLst>
                 </a:gridCol>
                 <a:gridCol w="5487959">
                   <a:extLst>
                     <a:ext uri="{9D8B030D-6E8A-4147-A177-3AD203B41FA5}">
-                      <a16:colId xmlns:mc="http://schemas.openxmlformats.org/markup-compatibility/2006" xmlns:a14="http://schemas.microsoft.com/office/drawing/2010/main" xmlns="" xmlns:a16="http://schemas.microsoft.com/office/drawing/2014/main" val="2348020364"/>
+                      <a16:colId xmlns:a16="http://schemas.microsoft.com/office/drawing/2014/main" val="2348020364"/>
                     </a:ext>
                   </a:extLst>
                 </a:gridCol>
@@ -8852,7 +8805,7 @@
                 </a:tc>
                 <a:extLst>
                   <a:ext uri="{0D108BD9-81ED-4DB2-BD59-A6C34878D82A}">
-                    <a16:rowId xmlns:mc="http://schemas.openxmlformats.org/markup-compatibility/2006" xmlns:a14="http://schemas.microsoft.com/office/drawing/2010/main" xmlns="" xmlns:a16="http://schemas.microsoft.com/office/drawing/2014/main" val="3434431623"/>
+                    <a16:rowId xmlns:a16="http://schemas.microsoft.com/office/drawing/2014/main" val="3434431623"/>
                   </a:ext>
                 </a:extLst>
               </a:tr>
@@ -8931,7 +8884,7 @@
                 </a:tc>
                 <a:extLst>
                   <a:ext uri="{0D108BD9-81ED-4DB2-BD59-A6C34878D82A}">
-                    <a16:rowId xmlns:mc="http://schemas.openxmlformats.org/markup-compatibility/2006" xmlns:a14="http://schemas.microsoft.com/office/drawing/2010/main" xmlns="" xmlns:a16="http://schemas.microsoft.com/office/drawing/2014/main" val="1589752509"/>
+                    <a16:rowId xmlns:a16="http://schemas.microsoft.com/office/drawing/2014/main" val="1589752509"/>
                   </a:ext>
                 </a:extLst>
               </a:tr>
@@ -9038,7 +8991,7 @@
                 </a:tc>
                 <a:extLst>
                   <a:ext uri="{0D108BD9-81ED-4DB2-BD59-A6C34878D82A}">
-                    <a16:rowId xmlns:mc="http://schemas.openxmlformats.org/markup-compatibility/2006" xmlns:a14="http://schemas.microsoft.com/office/drawing/2010/main" xmlns="" xmlns:a16="http://schemas.microsoft.com/office/drawing/2014/main" val="3925105500"/>
+                    <a16:rowId xmlns:a16="http://schemas.microsoft.com/office/drawing/2014/main" val="3925105500"/>
                   </a:ext>
                 </a:extLst>
               </a:tr>
@@ -9081,7 +9034,7 @@
           <p:cNvPr id="22" name="Rectangle 21">
             <a:extLst>
               <a:ext uri="{FF2B5EF4-FFF2-40B4-BE49-F238E27FC236}">
-                <a16:creationId xmlns="" xmlns:a16="http://schemas.microsoft.com/office/drawing/2014/main" id="{620A7DEA-950C-4954-B3B7-2672370FABF4}"/>
+                <a16:creationId xmlns:a16="http://schemas.microsoft.com/office/drawing/2014/main" id="{620A7DEA-950C-4954-B3B7-2672370FABF4}"/>
               </a:ext>
             </a:extLst>
           </p:cNvPr>
@@ -9104,13 +9057,13 @@
           <a:lstStyle/>
           <a:p>
             <a:r>
-              <a:rPr lang="en-US" sz="3600" b="1" dirty="0" smtClean="0"/>
+              <a:rPr lang="en-US" sz="3600" b="1" dirty="0"/>
               <a:t>ENGINEERING CHEMISTRY </a:t>
             </a:r>
           </a:p>
           <a:p>
             <a:r>
-              <a:rPr lang="en-IN" sz="2400" b="1" dirty="0" smtClean="0">
+              <a:rPr lang="en-IN" sz="2400" b="1" dirty="0">
                 <a:solidFill>
                   <a:srgbClr val="C00000"/>
                 </a:solidFill>
@@ -9120,7 +9073,7 @@
               <a:t>Module I- </a:t>
             </a:r>
             <a:r>
-              <a:rPr lang="en-US" sz="2400" b="1" dirty="0" smtClean="0">
+              <a:rPr lang="en-US" sz="2400" b="1" dirty="0">
                 <a:solidFill>
                   <a:srgbClr val="C00000"/>
                 </a:solidFill>
@@ -9142,7 +9095,7 @@
           <p:cNvPr id="8" name="Straight Connector 7">
             <a:extLst>
               <a:ext uri="{FF2B5EF4-FFF2-40B4-BE49-F238E27FC236}">
-                <a16:creationId xmlns="" xmlns:a16="http://schemas.microsoft.com/office/drawing/2014/main" id="{A4293697-6E2C-4331-B4E1-C58B355192F4}"/>
+                <a16:creationId xmlns:a16="http://schemas.microsoft.com/office/drawing/2014/main" id="{A4293697-6E2C-4331-B4E1-C58B355192F4}"/>
               </a:ext>
             </a:extLst>
           </p:cNvPr>
@@ -9211,7 +9164,7 @@
           <p:cNvPr id="5" name="Content Placeholder 2">
             <a:extLst>
               <a:ext uri="{FF2B5EF4-FFF2-40B4-BE49-F238E27FC236}">
-                <a16:creationId xmlns="" xmlns:a16="http://schemas.microsoft.com/office/drawing/2014/main" id="{7849BFCE-04D0-FE3D-FC5A-889640F57D96}"/>
+                <a16:creationId xmlns:a16="http://schemas.microsoft.com/office/drawing/2014/main" id="{7849BFCE-04D0-FE3D-FC5A-889640F57D96}"/>
               </a:ext>
             </a:extLst>
           </p:cNvPr>
@@ -9327,7 +9280,7 @@
           <p:cNvPr id="6" name="Picture 5">
             <a:extLst>
               <a:ext uri="{FF2B5EF4-FFF2-40B4-BE49-F238E27FC236}">
-                <a16:creationId xmlns="" xmlns:a16="http://schemas.microsoft.com/office/drawing/2014/main" id="{1C78F40A-AB5B-B9D3-1CAD-0DC1AC606AAE}"/>
+                <a16:creationId xmlns:a16="http://schemas.microsoft.com/office/drawing/2014/main" id="{1C78F40A-AB5B-B9D3-1CAD-0DC1AC606AAE}"/>
               </a:ext>
             </a:extLst>
           </p:cNvPr>
@@ -9387,7 +9340,7 @@
           <p:cNvPr id="22" name="Rectangle 21">
             <a:extLst>
               <a:ext uri="{FF2B5EF4-FFF2-40B4-BE49-F238E27FC236}">
-                <a16:creationId xmlns="" xmlns:a16="http://schemas.microsoft.com/office/drawing/2014/main" id="{620A7DEA-950C-4954-B3B7-2672370FABF4}"/>
+                <a16:creationId xmlns:a16="http://schemas.microsoft.com/office/drawing/2014/main" id="{620A7DEA-950C-4954-B3B7-2672370FABF4}"/>
               </a:ext>
             </a:extLst>
           </p:cNvPr>
@@ -9410,13 +9363,13 @@
           <a:lstStyle/>
           <a:p>
             <a:r>
-              <a:rPr lang="en-US" sz="3600" b="1" dirty="0" smtClean="0"/>
+              <a:rPr lang="en-US" sz="3600" b="1" dirty="0"/>
               <a:t>ENGINEERING CHEMISTRY </a:t>
             </a:r>
           </a:p>
           <a:p>
             <a:r>
-              <a:rPr lang="en-IN" sz="2400" b="1" dirty="0" smtClean="0">
+              <a:rPr lang="en-IN" sz="2400" b="1" dirty="0">
                 <a:solidFill>
                   <a:srgbClr val="C00000"/>
                 </a:solidFill>
@@ -9426,7 +9379,7 @@
               <a:t>Module I- </a:t>
             </a:r>
             <a:r>
-              <a:rPr lang="en-US" sz="2400" b="1" dirty="0" smtClean="0">
+              <a:rPr lang="en-US" sz="2400" b="1" dirty="0">
                 <a:solidFill>
                   <a:srgbClr val="C00000"/>
                 </a:solidFill>
@@ -9448,7 +9401,7 @@
           <p:cNvPr id="8" name="Straight Connector 7">
             <a:extLst>
               <a:ext uri="{FF2B5EF4-FFF2-40B4-BE49-F238E27FC236}">
-                <a16:creationId xmlns="" xmlns:a16="http://schemas.microsoft.com/office/drawing/2014/main" id="{A4293697-6E2C-4331-B4E1-C58B355192F4}"/>
+                <a16:creationId xmlns:a16="http://schemas.microsoft.com/office/drawing/2014/main" id="{A4293697-6E2C-4331-B4E1-C58B355192F4}"/>
               </a:ext>
             </a:extLst>
           </p:cNvPr>
@@ -9517,7 +9470,7 @@
           <p:cNvPr id="5" name="Content Placeholder 2">
             <a:extLst>
               <a:ext uri="{FF2B5EF4-FFF2-40B4-BE49-F238E27FC236}">
-                <a16:creationId xmlns="" xmlns:a16="http://schemas.microsoft.com/office/drawing/2014/main" id="{0D4CDD47-2B79-02AA-6811-E6BFF6603044}"/>
+                <a16:creationId xmlns:a16="http://schemas.microsoft.com/office/drawing/2014/main" id="{0D4CDD47-2B79-02AA-6811-E6BFF6603044}"/>
               </a:ext>
             </a:extLst>
           </p:cNvPr>
@@ -9557,18 +9510,11 @@
               <a:buChar char="Ø"/>
             </a:pPr>
             <a:r>
-              <a:rPr lang="en-US" sz="2400" dirty="0" smtClean="0">
-                <a:latin typeface="Times New Roman" pitchFamily="18" charset="0"/>
-                <a:cs typeface="Times New Roman" pitchFamily="18" charset="0"/>
-              </a:rPr>
-              <a:t>Molecular </a:t>
-            </a:r>
-            <a:r>
               <a:rPr lang="en-US" sz="2400" dirty="0">
                 <a:latin typeface="Times New Roman" pitchFamily="18" charset="0"/>
                 <a:cs typeface="Times New Roman" pitchFamily="18" charset="0"/>
               </a:rPr>
-              <a:t>dynamics is a molecular mechanics program designed to mimic the movement of atoms within a molecule. The laws of motion to molecule is the base for it..</a:t>
+              <a:t>Molecular dynamics is a molecular mechanics program designed to mimic the movement of atoms within a molecule. The laws of motion to molecule is the base for it..</a:t>
             </a:r>
           </a:p>
           <a:p>
@@ -9577,18 +9523,11 @@
               <a:buChar char="Ø"/>
             </a:pPr>
             <a:r>
-              <a:rPr lang="en-US" sz="2400" dirty="0" smtClean="0">
-                <a:latin typeface="Times New Roman" pitchFamily="18" charset="0"/>
-                <a:cs typeface="Times New Roman" pitchFamily="18" charset="0"/>
-              </a:rPr>
-              <a:t>Molecular </a:t>
-            </a:r>
-            <a:r>
               <a:rPr lang="en-US" sz="2400" dirty="0">
                 <a:latin typeface="Times New Roman" pitchFamily="18" charset="0"/>
                 <a:cs typeface="Times New Roman" pitchFamily="18" charset="0"/>
               </a:rPr>
-              <a:t>dynamics can be carried out on a molecule to generate different conformation which on energy minimization, give a range of stable conformation. Alternatively, bonds can be rotated in a stepwise process to generate different conformation.</a:t>
+              <a:t>Molecular dynamics can be carried out on a molecule to generate different conformation which on energy minimization, give a range of stable conformation. Alternatively, bonds can be rotated in a stepwise process to generate different conformation.</a:t>
             </a:r>
           </a:p>
           <a:p>
@@ -9597,18 +9536,11 @@
               <a:buChar char="Ø"/>
             </a:pPr>
             <a:r>
-              <a:rPr lang="en-US" sz="2400" dirty="0" smtClean="0">
-                <a:latin typeface="Times New Roman" pitchFamily="18" charset="0"/>
-                <a:cs typeface="Times New Roman" pitchFamily="18" charset="0"/>
-              </a:rPr>
-              <a:t>Molecular </a:t>
-            </a:r>
-            <a:r>
               <a:rPr lang="en-US" sz="2400" dirty="0">
                 <a:latin typeface="Times New Roman" pitchFamily="18" charset="0"/>
                 <a:cs typeface="Times New Roman" pitchFamily="18" charset="0"/>
               </a:rPr>
-              <a:t>dynamics can also be used to find minimum energy structures and conformational analysis.</a:t>
+              <a:t>Molecular dynamics can also be used to find minimum energy structures and conformational analysis.</a:t>
             </a:r>
           </a:p>
           <a:p>
@@ -9628,7 +9560,7 @@
           <p:cNvPr id="6" name="Picture 5">
             <a:extLst>
               <a:ext uri="{FF2B5EF4-FFF2-40B4-BE49-F238E27FC236}">
-                <a16:creationId xmlns="" xmlns:a16="http://schemas.microsoft.com/office/drawing/2014/main" id="{E172C941-6603-B812-23C2-C2162936AA0C}"/>
+                <a16:creationId xmlns:a16="http://schemas.microsoft.com/office/drawing/2014/main" id="{E172C941-6603-B812-23C2-C2162936AA0C}"/>
               </a:ext>
             </a:extLst>
           </p:cNvPr>
@@ -9688,7 +9620,7 @@
           <p:cNvPr id="22" name="Rectangle 21">
             <a:extLst>
               <a:ext uri="{FF2B5EF4-FFF2-40B4-BE49-F238E27FC236}">
-                <a16:creationId xmlns="" xmlns:a16="http://schemas.microsoft.com/office/drawing/2014/main" id="{620A7DEA-950C-4954-B3B7-2672370FABF4}"/>
+                <a16:creationId xmlns:a16="http://schemas.microsoft.com/office/drawing/2014/main" id="{620A7DEA-950C-4954-B3B7-2672370FABF4}"/>
               </a:ext>
             </a:extLst>
           </p:cNvPr>
@@ -9711,13 +9643,13 @@
           <a:lstStyle/>
           <a:p>
             <a:r>
-              <a:rPr lang="en-US" sz="3600" b="1" dirty="0" smtClean="0"/>
+              <a:rPr lang="en-US" sz="3600" b="1" dirty="0"/>
               <a:t>ENGINEERING CHEMISTRY </a:t>
             </a:r>
           </a:p>
           <a:p>
             <a:r>
-              <a:rPr lang="en-IN" sz="2400" b="1" dirty="0" smtClean="0">
+              <a:rPr lang="en-IN" sz="2400" b="1" dirty="0">
                 <a:solidFill>
                   <a:srgbClr val="C00000"/>
                 </a:solidFill>
@@ -9727,7 +9659,7 @@
               <a:t>Module I- </a:t>
             </a:r>
             <a:r>
-              <a:rPr lang="en-US" sz="2400" b="1" dirty="0" smtClean="0">
+              <a:rPr lang="en-US" sz="2400" b="1" dirty="0">
                 <a:solidFill>
                   <a:srgbClr val="C00000"/>
                 </a:solidFill>
@@ -9749,7 +9681,7 @@
           <p:cNvPr id="8" name="Straight Connector 7">
             <a:extLst>
               <a:ext uri="{FF2B5EF4-FFF2-40B4-BE49-F238E27FC236}">
-                <a16:creationId xmlns="" xmlns:a16="http://schemas.microsoft.com/office/drawing/2014/main" id="{A4293697-6E2C-4331-B4E1-C58B355192F4}"/>
+                <a16:creationId xmlns:a16="http://schemas.microsoft.com/office/drawing/2014/main" id="{A4293697-6E2C-4331-B4E1-C58B355192F4}"/>
               </a:ext>
             </a:extLst>
           </p:cNvPr>
@@ -9818,7 +9750,7 @@
           <p:cNvPr id="5" name="Content Placeholder 2">
             <a:extLst>
               <a:ext uri="{FF2B5EF4-FFF2-40B4-BE49-F238E27FC236}">
-                <a16:creationId xmlns="" xmlns:a16="http://schemas.microsoft.com/office/drawing/2014/main" id="{E810A174-4A8D-DB59-5169-9F095557731C}"/>
+                <a16:creationId xmlns:a16="http://schemas.microsoft.com/office/drawing/2014/main" id="{E810A174-4A8D-DB59-5169-9F095557731C}"/>
               </a:ext>
             </a:extLst>
           </p:cNvPr>
@@ -9952,7 +9884,7 @@
           <p:cNvPr id="22" name="Rectangle 21">
             <a:extLst>
               <a:ext uri="{FF2B5EF4-FFF2-40B4-BE49-F238E27FC236}">
-                <a16:creationId xmlns="" xmlns:a16="http://schemas.microsoft.com/office/drawing/2014/main" id="{620A7DEA-950C-4954-B3B7-2672370FABF4}"/>
+                <a16:creationId xmlns:a16="http://schemas.microsoft.com/office/drawing/2014/main" id="{620A7DEA-950C-4954-B3B7-2672370FABF4}"/>
               </a:ext>
             </a:extLst>
           </p:cNvPr>
@@ -9975,13 +9907,13 @@
           <a:lstStyle/>
           <a:p>
             <a:r>
-              <a:rPr lang="en-US" sz="3600" b="1" dirty="0" smtClean="0"/>
+              <a:rPr lang="en-US" sz="3600" b="1" dirty="0"/>
               <a:t>ENGINEERING CHEMISTRY </a:t>
             </a:r>
           </a:p>
           <a:p>
             <a:r>
-              <a:rPr lang="en-IN" sz="2400" b="1" dirty="0" smtClean="0">
+              <a:rPr lang="en-IN" sz="2400" b="1" dirty="0">
                 <a:solidFill>
                   <a:srgbClr val="C00000"/>
                 </a:solidFill>
@@ -9991,7 +9923,7 @@
               <a:t>Module I- </a:t>
             </a:r>
             <a:r>
-              <a:rPr lang="en-US" sz="2400" b="1" dirty="0" smtClean="0">
+              <a:rPr lang="en-US" sz="2400" b="1" dirty="0">
                 <a:solidFill>
                   <a:srgbClr val="C00000"/>
                 </a:solidFill>
@@ -10013,7 +9945,7 @@
           <p:cNvPr id="8" name="Straight Connector 7">
             <a:extLst>
               <a:ext uri="{FF2B5EF4-FFF2-40B4-BE49-F238E27FC236}">
-                <a16:creationId xmlns="" xmlns:a16="http://schemas.microsoft.com/office/drawing/2014/main" id="{A4293697-6E2C-4331-B4E1-C58B355192F4}"/>
+                <a16:creationId xmlns:a16="http://schemas.microsoft.com/office/drawing/2014/main" id="{A4293697-6E2C-4331-B4E1-C58B355192F4}"/>
               </a:ext>
             </a:extLst>
           </p:cNvPr>
@@ -10082,7 +10014,7 @@
           <p:cNvPr id="5" name="Content Placeholder 2">
             <a:extLst>
               <a:ext uri="{FF2B5EF4-FFF2-40B4-BE49-F238E27FC236}">
-                <a16:creationId xmlns="" xmlns:a16="http://schemas.microsoft.com/office/drawing/2014/main" id="{56431788-6C80-728A-A5AB-9B5F64262193}"/>
+                <a16:creationId xmlns:a16="http://schemas.microsoft.com/office/drawing/2014/main" id="{56431788-6C80-728A-A5AB-9B5F64262193}"/>
               </a:ext>
             </a:extLst>
           </p:cNvPr>
@@ -10113,14 +10045,7 @@
                 <a:latin typeface="Times New Roman" pitchFamily="18" charset="0"/>
                 <a:cs typeface="Times New Roman" pitchFamily="18" charset="0"/>
               </a:rPr>
-              <a:t>Ab initio calculations</a:t>
-            </a:r>
-            <a:r>
-              <a:rPr lang="en-US" sz="2400" b="1" dirty="0" smtClean="0">
-                <a:latin typeface="Times New Roman" pitchFamily="18" charset="0"/>
-                <a:cs typeface="Times New Roman" pitchFamily="18" charset="0"/>
-              </a:rPr>
-              <a:t>:</a:t>
+              <a:t>Ab initio calculations:</a:t>
             </a:r>
           </a:p>
           <a:p>
@@ -10141,25 +10066,18 @@
               <a:buChar char="Ø"/>
             </a:pPr>
             <a:r>
-              <a:rPr lang="en-US" sz="2400" dirty="0" err="1" smtClean="0">
+              <a:rPr lang="en-US" sz="2400" dirty="0" err="1">
                 <a:latin typeface="Times New Roman" pitchFamily="18" charset="0"/>
                 <a:cs typeface="Times New Roman" pitchFamily="18" charset="0"/>
               </a:rPr>
               <a:t>Ab</a:t>
             </a:r>
             <a:r>
-              <a:rPr lang="en-US" sz="2400" dirty="0" smtClean="0">
-                <a:latin typeface="Times New Roman" pitchFamily="18" charset="0"/>
-                <a:cs typeface="Times New Roman" pitchFamily="18" charset="0"/>
-              </a:rPr>
-              <a:t> </a:t>
-            </a:r>
-            <a:r>
               <a:rPr lang="en-US" sz="2400" dirty="0">
                 <a:latin typeface="Times New Roman" pitchFamily="18" charset="0"/>
                 <a:cs typeface="Times New Roman" pitchFamily="18" charset="0"/>
               </a:rPr>
-              <a:t>initio calculations are based on Schrödinger equation.</a:t>
+              <a:t> initio calculations are based on Schrödinger equation.</a:t>
             </a:r>
           </a:p>
           <a:p>
@@ -10339,7 +10257,7 @@
           <p:cNvPr id="22" name="Rectangle 21">
             <a:extLst>
               <a:ext uri="{FF2B5EF4-FFF2-40B4-BE49-F238E27FC236}">
-                <a16:creationId xmlns="" xmlns:a16="http://schemas.microsoft.com/office/drawing/2014/main" id="{620A7DEA-950C-4954-B3B7-2672370FABF4}"/>
+                <a16:creationId xmlns:a16="http://schemas.microsoft.com/office/drawing/2014/main" id="{620A7DEA-950C-4954-B3B7-2672370FABF4}"/>
               </a:ext>
             </a:extLst>
           </p:cNvPr>
@@ -10362,13 +10280,13 @@
           <a:lstStyle/>
           <a:p>
             <a:r>
-              <a:rPr lang="en-US" sz="3600" b="1" dirty="0" smtClean="0"/>
+              <a:rPr lang="en-US" sz="3600" b="1" dirty="0"/>
               <a:t>ENGINEERING CHEMISTRY </a:t>
             </a:r>
           </a:p>
           <a:p>
             <a:r>
-              <a:rPr lang="en-IN" sz="2400" b="1" dirty="0" smtClean="0">
+              <a:rPr lang="en-IN" sz="2400" b="1" dirty="0">
                 <a:solidFill>
                   <a:srgbClr val="C00000"/>
                 </a:solidFill>
@@ -10378,7 +10296,7 @@
               <a:t>Module I- </a:t>
             </a:r>
             <a:r>
-              <a:rPr lang="en-US" sz="2400" b="1" dirty="0" smtClean="0">
+              <a:rPr lang="en-US" sz="2400" b="1" dirty="0">
                 <a:solidFill>
                   <a:srgbClr val="C00000"/>
                 </a:solidFill>
@@ -10400,7 +10318,7 @@
           <p:cNvPr id="8" name="Straight Connector 7">
             <a:extLst>
               <a:ext uri="{FF2B5EF4-FFF2-40B4-BE49-F238E27FC236}">
-                <a16:creationId xmlns="" xmlns:a16="http://schemas.microsoft.com/office/drawing/2014/main" id="{A4293697-6E2C-4331-B4E1-C58B355192F4}"/>
+                <a16:creationId xmlns:a16="http://schemas.microsoft.com/office/drawing/2014/main" id="{A4293697-6E2C-4331-B4E1-C58B355192F4}"/>
               </a:ext>
             </a:extLst>
           </p:cNvPr>
@@ -10469,7 +10387,7 @@
           <p:cNvPr id="5" name="Content Placeholder 2">
             <a:extLst>
               <a:ext uri="{FF2B5EF4-FFF2-40B4-BE49-F238E27FC236}">
-                <a16:creationId xmlns="" xmlns:a16="http://schemas.microsoft.com/office/drawing/2014/main" id="{6185F85D-919F-2814-B78F-2A2AD04E95AA}"/>
+                <a16:creationId xmlns:a16="http://schemas.microsoft.com/office/drawing/2014/main" id="{6185F85D-919F-2814-B78F-2A2AD04E95AA}"/>
               </a:ext>
             </a:extLst>
           </p:cNvPr>
@@ -10652,7 +10570,7 @@
           <p:cNvPr id="22" name="Rectangle 21">
             <a:extLst>
               <a:ext uri="{FF2B5EF4-FFF2-40B4-BE49-F238E27FC236}">
-                <a16:creationId xmlns="" xmlns:a16="http://schemas.microsoft.com/office/drawing/2014/main" id="{620A7DEA-950C-4954-B3B7-2672370FABF4}"/>
+                <a16:creationId xmlns:a16="http://schemas.microsoft.com/office/drawing/2014/main" id="{620A7DEA-950C-4954-B3B7-2672370FABF4}"/>
               </a:ext>
             </a:extLst>
           </p:cNvPr>
@@ -10675,13 +10593,13 @@
           <a:lstStyle/>
           <a:p>
             <a:r>
-              <a:rPr lang="en-US" sz="3600" b="1" dirty="0" smtClean="0"/>
+              <a:rPr lang="en-US" sz="3600" b="1" dirty="0"/>
               <a:t>ENGINEERING CHEMISTRY </a:t>
             </a:r>
           </a:p>
           <a:p>
             <a:r>
-              <a:rPr lang="en-IN" sz="2400" b="1" dirty="0" smtClean="0">
+              <a:rPr lang="en-IN" sz="2400" b="1" dirty="0">
                 <a:solidFill>
                   <a:srgbClr val="C00000"/>
                 </a:solidFill>
@@ -10691,7 +10609,7 @@
               <a:t>Module I- </a:t>
             </a:r>
             <a:r>
-              <a:rPr lang="en-US" sz="2400" b="1" dirty="0" smtClean="0">
+              <a:rPr lang="en-US" sz="2400" b="1" dirty="0">
                 <a:solidFill>
                   <a:srgbClr val="C00000"/>
                 </a:solidFill>
@@ -10713,7 +10631,7 @@
           <p:cNvPr id="8" name="Straight Connector 7">
             <a:extLst>
               <a:ext uri="{FF2B5EF4-FFF2-40B4-BE49-F238E27FC236}">
-                <a16:creationId xmlns="" xmlns:a16="http://schemas.microsoft.com/office/drawing/2014/main" id="{A4293697-6E2C-4331-B4E1-C58B355192F4}"/>
+                <a16:creationId xmlns:a16="http://schemas.microsoft.com/office/drawing/2014/main" id="{A4293697-6E2C-4331-B4E1-C58B355192F4}"/>
               </a:ext>
             </a:extLst>
           </p:cNvPr>
@@ -10782,7 +10700,7 @@
           <p:cNvPr id="5" name="Content Placeholder 2">
             <a:extLst>
               <a:ext uri="{FF2B5EF4-FFF2-40B4-BE49-F238E27FC236}">
-                <a16:creationId xmlns="" xmlns:a16="http://schemas.microsoft.com/office/drawing/2014/main" id="{669988F9-1EF7-8922-5CA5-919F3760724A}"/>
+                <a16:creationId xmlns:a16="http://schemas.microsoft.com/office/drawing/2014/main" id="{669988F9-1EF7-8922-5CA5-919F3760724A}"/>
               </a:ext>
             </a:extLst>
           </p:cNvPr>
@@ -10826,18 +10744,11 @@
               </a:lnSpc>
             </a:pPr>
             <a:r>
-              <a:rPr lang="en-US" sz="2200" dirty="0" smtClean="0">
-                <a:latin typeface="Times New Roman" pitchFamily="18" charset="0"/>
-                <a:cs typeface="Times New Roman" pitchFamily="18" charset="0"/>
-              </a:rPr>
-              <a:t>Electronic </a:t>
-            </a:r>
-            <a:r>
               <a:rPr lang="en-US" sz="2200" dirty="0">
                 <a:latin typeface="Times New Roman" pitchFamily="18" charset="0"/>
                 <a:cs typeface="Times New Roman" pitchFamily="18" charset="0"/>
               </a:rPr>
-              <a:t>structure predictions.</a:t>
+              <a:t>Electronic structure predictions.</a:t>
             </a:r>
           </a:p>
           <a:p>
@@ -10848,10 +10759,20 @@
             </a:pPr>
             <a:r>
               <a:rPr lang="en-US" sz="2200" dirty="0">
+                <a:highlight>
+                  <a:srgbClr val="FFFF00"/>
+                </a:highlight>
                 <a:latin typeface="Times New Roman" pitchFamily="18" charset="0"/>
                 <a:cs typeface="Times New Roman" pitchFamily="18" charset="0"/>
               </a:rPr>
-              <a:t>Geometry optimizations or energy minimizations.</a:t>
+              <a:t>Geometry optimizations or energy minimizations</a:t>
+            </a:r>
+            <a:r>
+              <a:rPr lang="en-US" sz="2200" dirty="0">
+                <a:latin typeface="Times New Roman" pitchFamily="18" charset="0"/>
+                <a:cs typeface="Times New Roman" pitchFamily="18" charset="0"/>
+              </a:rPr>
+              <a:t>.</a:t>
             </a:r>
           </a:p>
           <a:p>
@@ -10875,32 +10796,11 @@
               </a:lnSpc>
             </a:pPr>
             <a:r>
-              <a:rPr lang="en-US" sz="2200" dirty="0" smtClean="0">
-                <a:latin typeface="Times New Roman" pitchFamily="18" charset="0"/>
-                <a:cs typeface="Times New Roman" pitchFamily="18" charset="0"/>
-              </a:rPr>
-              <a:t>Finding </a:t>
-            </a:r>
-            <a:r>
               <a:rPr lang="en-US" sz="2200" dirty="0">
                 <a:latin typeface="Times New Roman" pitchFamily="18" charset="0"/>
                 <a:cs typeface="Times New Roman" pitchFamily="18" charset="0"/>
               </a:rPr>
-              <a:t>transition structure and reaction </a:t>
-            </a:r>
-            <a:r>
-              <a:rPr lang="en-US" sz="2200" dirty="0" smtClean="0">
-                <a:latin typeface="Times New Roman" pitchFamily="18" charset="0"/>
-                <a:cs typeface="Times New Roman" pitchFamily="18" charset="0"/>
-              </a:rPr>
-              <a:t>paths and molecular </a:t>
-            </a:r>
-            <a:r>
-              <a:rPr lang="en-US" sz="2200" dirty="0">
-                <a:latin typeface="Times New Roman" pitchFamily="18" charset="0"/>
-                <a:cs typeface="Times New Roman" pitchFamily="18" charset="0"/>
-              </a:rPr>
-              <a:t>docking: protein – protein, protein – ligand interactions.</a:t>
+              <a:t>Finding transition structure and reaction paths and molecular docking: protein – protein, protein – ligand interactions.</a:t>
             </a:r>
           </a:p>
           <a:p>
@@ -10911,10 +10811,20 @@
             </a:pPr>
             <a:r>
               <a:rPr lang="en-US" sz="2200" dirty="0">
+                <a:highlight>
+                  <a:srgbClr val="FFFF00"/>
+                </a:highlight>
                 <a:latin typeface="Times New Roman" pitchFamily="18" charset="0"/>
                 <a:cs typeface="Times New Roman" pitchFamily="18" charset="0"/>
               </a:rPr>
-              <a:t>Electron charge distribution calculations.</a:t>
+              <a:t>Electron charge distribution calculations</a:t>
+            </a:r>
+            <a:r>
+              <a:rPr lang="en-US" sz="2200" dirty="0">
+                <a:latin typeface="Times New Roman" pitchFamily="18" charset="0"/>
+                <a:cs typeface="Times New Roman" pitchFamily="18" charset="0"/>
+              </a:rPr>
+              <a:t>.</a:t>
             </a:r>
           </a:p>
           <a:p>
@@ -10925,10 +10835,20 @@
             </a:pPr>
             <a:r>
               <a:rPr lang="en-US" sz="2200" dirty="0">
+                <a:highlight>
+                  <a:srgbClr val="FFFF00"/>
+                </a:highlight>
                 <a:latin typeface="Times New Roman" pitchFamily="18" charset="0"/>
                 <a:cs typeface="Times New Roman" pitchFamily="18" charset="0"/>
               </a:rPr>
-              <a:t>Calculation of rate constants for chemical reactions : chemical kinetics.</a:t>
+              <a:t>Calculation of rate constants for chemical reactions : chemical kinetics</a:t>
+            </a:r>
+            <a:r>
+              <a:rPr lang="en-US" sz="2200" dirty="0">
+                <a:latin typeface="Times New Roman" pitchFamily="18" charset="0"/>
+                <a:cs typeface="Times New Roman" pitchFamily="18" charset="0"/>
+              </a:rPr>
+              <a:t>.</a:t>
             </a:r>
           </a:p>
           <a:p>
@@ -11035,7 +10955,7 @@
           <p:cNvPr id="22" name="Rectangle 21">
             <a:extLst>
               <a:ext uri="{FF2B5EF4-FFF2-40B4-BE49-F238E27FC236}">
-                <a16:creationId xmlns="" xmlns:a16="http://schemas.microsoft.com/office/drawing/2014/main" id="{620A7DEA-950C-4954-B3B7-2672370FABF4}"/>
+                <a16:creationId xmlns:a16="http://schemas.microsoft.com/office/drawing/2014/main" id="{620A7DEA-950C-4954-B3B7-2672370FABF4}"/>
               </a:ext>
             </a:extLst>
           </p:cNvPr>
@@ -11058,13 +10978,13 @@
           <a:lstStyle/>
           <a:p>
             <a:r>
-              <a:rPr lang="en-US" sz="3600" b="1" dirty="0" smtClean="0"/>
+              <a:rPr lang="en-US" sz="3600" b="1" dirty="0"/>
               <a:t>ENGINEERING CHEMISTRY </a:t>
             </a:r>
           </a:p>
           <a:p>
             <a:r>
-              <a:rPr lang="en-IN" sz="2400" b="1" dirty="0" smtClean="0">
+              <a:rPr lang="en-IN" sz="2400" b="1" dirty="0">
                 <a:solidFill>
                   <a:srgbClr val="C00000"/>
                 </a:solidFill>
@@ -11074,7 +10994,7 @@
               <a:t>Module I- </a:t>
             </a:r>
             <a:r>
-              <a:rPr lang="en-US" sz="2400" b="1" dirty="0" smtClean="0">
+              <a:rPr lang="en-US" sz="2400" b="1" dirty="0">
                 <a:solidFill>
                   <a:srgbClr val="C00000"/>
                 </a:solidFill>
@@ -11096,7 +11016,7 @@
           <p:cNvPr id="8" name="Straight Connector 7">
             <a:extLst>
               <a:ext uri="{FF2B5EF4-FFF2-40B4-BE49-F238E27FC236}">
-                <a16:creationId xmlns="" xmlns:a16="http://schemas.microsoft.com/office/drawing/2014/main" id="{A4293697-6E2C-4331-B4E1-C58B355192F4}"/>
+                <a16:creationId xmlns:a16="http://schemas.microsoft.com/office/drawing/2014/main" id="{A4293697-6E2C-4331-B4E1-C58B355192F4}"/>
               </a:ext>
             </a:extLst>
           </p:cNvPr>
@@ -11165,7 +11085,7 @@
           <p:cNvPr id="6" name="TextBox 5">
             <a:extLst>
               <a:ext uri="{FF2B5EF4-FFF2-40B4-BE49-F238E27FC236}">
-                <a16:creationId xmlns="" xmlns:a16="http://schemas.microsoft.com/office/drawing/2014/main" id="{012B14E9-B7B4-F86E-04F7-C103CA74A216}"/>
+                <a16:creationId xmlns:a16="http://schemas.microsoft.com/office/drawing/2014/main" id="{012B14E9-B7B4-F86E-04F7-C103CA74A216}"/>
               </a:ext>
             </a:extLst>
           </p:cNvPr>
@@ -11204,7 +11124,7 @@
           <p:cNvPr id="9" name="TextBox 8">
             <a:extLst>
               <a:ext uri="{FF2B5EF4-FFF2-40B4-BE49-F238E27FC236}">
-                <a16:creationId xmlns="" xmlns:a16="http://schemas.microsoft.com/office/drawing/2014/main" id="{B5A687AE-4CB4-2FF1-5742-8DCA356F7A8A}"/>
+                <a16:creationId xmlns:a16="http://schemas.microsoft.com/office/drawing/2014/main" id="{B5A687AE-4CB4-2FF1-5742-8DCA356F7A8A}"/>
               </a:ext>
             </a:extLst>
           </p:cNvPr>
@@ -11542,7 +11462,7 @@
           <p:cNvPr id="22" name="Rectangle 21">
             <a:extLst>
               <a:ext uri="{FF2B5EF4-FFF2-40B4-BE49-F238E27FC236}">
-                <a16:creationId xmlns="" xmlns:a16="http://schemas.microsoft.com/office/drawing/2014/main" id="{620A7DEA-950C-4954-B3B7-2672370FABF4}"/>
+                <a16:creationId xmlns:a16="http://schemas.microsoft.com/office/drawing/2014/main" id="{620A7DEA-950C-4954-B3B7-2672370FABF4}"/>
               </a:ext>
             </a:extLst>
           </p:cNvPr>
@@ -11565,13 +11485,13 @@
           <a:lstStyle/>
           <a:p>
             <a:r>
-              <a:rPr lang="en-US" sz="3600" b="1" dirty="0" smtClean="0"/>
+              <a:rPr lang="en-US" sz="3600" b="1" dirty="0"/>
               <a:t>ENGINEERING CHEMISTRY </a:t>
             </a:r>
           </a:p>
           <a:p>
             <a:r>
-              <a:rPr lang="en-IN" sz="2400" b="1" dirty="0" smtClean="0">
+              <a:rPr lang="en-IN" sz="2400" b="1" dirty="0">
                 <a:solidFill>
                   <a:srgbClr val="C00000"/>
                 </a:solidFill>
@@ -11581,7 +11501,7 @@
               <a:t>Module I- </a:t>
             </a:r>
             <a:r>
-              <a:rPr lang="en-US" sz="2400" b="1" dirty="0" smtClean="0">
+              <a:rPr lang="en-US" sz="2400" b="1" dirty="0">
                 <a:solidFill>
                   <a:srgbClr val="C00000"/>
                 </a:solidFill>
@@ -11603,7 +11523,7 @@
           <p:cNvPr id="8" name="Straight Connector 7">
             <a:extLst>
               <a:ext uri="{FF2B5EF4-FFF2-40B4-BE49-F238E27FC236}">
-                <a16:creationId xmlns="" xmlns:a16="http://schemas.microsoft.com/office/drawing/2014/main" id="{A4293697-6E2C-4331-B4E1-C58B355192F4}"/>
+                <a16:creationId xmlns:a16="http://schemas.microsoft.com/office/drawing/2014/main" id="{A4293697-6E2C-4331-B4E1-C58B355192F4}"/>
               </a:ext>
             </a:extLst>
           </p:cNvPr>
@@ -11672,7 +11592,7 @@
           <p:cNvPr id="6" name="TextBox 5">
             <a:extLst>
               <a:ext uri="{FF2B5EF4-FFF2-40B4-BE49-F238E27FC236}">
-                <a16:creationId xmlns="" xmlns:a16="http://schemas.microsoft.com/office/drawing/2014/main" id="{20FD04FA-41EB-3638-4C15-24CC84DBCC56}"/>
+                <a16:creationId xmlns:a16="http://schemas.microsoft.com/office/drawing/2014/main" id="{20FD04FA-41EB-3638-4C15-24CC84DBCC56}"/>
               </a:ext>
             </a:extLst>
           </p:cNvPr>
@@ -11723,7 +11643,7 @@
           <p:cNvPr id="9" name="TextBox 1">
             <a:extLst>
               <a:ext uri="{FF2B5EF4-FFF2-40B4-BE49-F238E27FC236}">
-                <a16:creationId xmlns="" xmlns:a16="http://schemas.microsoft.com/office/drawing/2014/main" id="{03035573-5A3B-991F-F5BD-ABC9E086A760}"/>
+                <a16:creationId xmlns:a16="http://schemas.microsoft.com/office/drawing/2014/main" id="{03035573-5A3B-991F-F5BD-ABC9E086A760}"/>
               </a:ext>
             </a:extLst>
           </p:cNvPr>
@@ -11781,7 +11701,7 @@
           <p:cNvPr id="22" name="Rectangle 21">
             <a:extLst>
               <a:ext uri="{FF2B5EF4-FFF2-40B4-BE49-F238E27FC236}">
-                <a16:creationId xmlns="" xmlns:a16="http://schemas.microsoft.com/office/drawing/2014/main" id="{620A7DEA-950C-4954-B3B7-2672370FABF4}"/>
+                <a16:creationId xmlns:a16="http://schemas.microsoft.com/office/drawing/2014/main" id="{620A7DEA-950C-4954-B3B7-2672370FABF4}"/>
               </a:ext>
             </a:extLst>
           </p:cNvPr>
@@ -11804,13 +11724,13 @@
           <a:lstStyle/>
           <a:p>
             <a:r>
-              <a:rPr lang="en-US" sz="3600" b="1" dirty="0" smtClean="0"/>
+              <a:rPr lang="en-US" sz="3600" b="1" dirty="0"/>
               <a:t>ENGINEERING CHEMISTRY </a:t>
             </a:r>
           </a:p>
           <a:p>
             <a:r>
-              <a:rPr lang="en-IN" sz="2400" b="1" dirty="0" smtClean="0">
+              <a:rPr lang="en-IN" sz="2400" b="1" dirty="0">
                 <a:solidFill>
                   <a:srgbClr val="C00000"/>
                 </a:solidFill>
@@ -11820,7 +11740,7 @@
               <a:t>Module I- </a:t>
             </a:r>
             <a:r>
-              <a:rPr lang="en-US" sz="2400" b="1" dirty="0" smtClean="0">
+              <a:rPr lang="en-US" sz="2400" b="1" dirty="0">
                 <a:solidFill>
                   <a:srgbClr val="C00000"/>
                 </a:solidFill>
@@ -11842,7 +11762,7 @@
           <p:cNvPr id="8" name="Straight Connector 7">
             <a:extLst>
               <a:ext uri="{FF2B5EF4-FFF2-40B4-BE49-F238E27FC236}">
-                <a16:creationId xmlns="" xmlns:a16="http://schemas.microsoft.com/office/drawing/2014/main" id="{A4293697-6E2C-4331-B4E1-C58B355192F4}"/>
+                <a16:creationId xmlns:a16="http://schemas.microsoft.com/office/drawing/2014/main" id="{A4293697-6E2C-4331-B4E1-C58B355192F4}"/>
               </a:ext>
             </a:extLst>
           </p:cNvPr>
@@ -11911,7 +11831,7 @@
           <p:cNvPr id="5" name="Content Placeholder 2">
             <a:extLst>
               <a:ext uri="{FF2B5EF4-FFF2-40B4-BE49-F238E27FC236}">
-                <a16:creationId xmlns="" xmlns:a16="http://schemas.microsoft.com/office/drawing/2014/main" id="{0FBF97F1-DF1D-CAA2-FAD3-B9EF87388EE7}"/>
+                <a16:creationId xmlns:a16="http://schemas.microsoft.com/office/drawing/2014/main" id="{0FBF97F1-DF1D-CAA2-FAD3-B9EF87388EE7}"/>
               </a:ext>
             </a:extLst>
           </p:cNvPr>
@@ -11941,23 +11861,12 @@
               <a:buAutoNum type="arabicPeriod"/>
             </a:pPr>
             <a:r>
-              <a:rPr lang="en-US" sz="2400" dirty="0" smtClean="0">
-                <a:latin typeface="Times New Roman" pitchFamily="18" charset="0"/>
-                <a:cs typeface="Times New Roman" pitchFamily="18" charset="0"/>
-              </a:rPr>
-              <a:t>Computational </a:t>
-            </a:r>
-            <a:r>
               <a:rPr lang="en-US" sz="2400" dirty="0">
                 <a:latin typeface="Times New Roman" pitchFamily="18" charset="0"/>
                 <a:cs typeface="Times New Roman" pitchFamily="18" charset="0"/>
               </a:rPr>
-              <a:t>chemistry plays a pivotal role in advancing our understanding of chemical systems and accelerating scientific discovery. </a:t>
-            </a:r>
-            <a:endParaRPr lang="en-US" sz="2400" dirty="0" smtClean="0">
-              <a:latin typeface="Times New Roman" pitchFamily="18" charset="0"/>
-              <a:cs typeface="Times New Roman" pitchFamily="18" charset="0"/>
-            </a:endParaRPr>
+              <a:t>Computational chemistry plays a pivotal role in advancing our understanding of chemical systems and accelerating scientific discovery. </a:t>
+            </a:r>
           </a:p>
           <a:p>
             <a:pPr marL="457200" indent="-457200">
@@ -11967,25 +11876,11 @@
               <a:buAutoNum type="arabicPeriod"/>
             </a:pPr>
             <a:r>
-              <a:rPr lang="en-US" sz="2400" dirty="0" smtClean="0">
-                <a:latin typeface="Times New Roman" pitchFamily="18" charset="0"/>
-                <a:cs typeface="Times New Roman" pitchFamily="18" charset="0"/>
-              </a:rPr>
-              <a:t>Its </a:t>
-            </a:r>
-            <a:r>
               <a:rPr lang="en-US" sz="2400" dirty="0">
                 <a:latin typeface="Times New Roman" pitchFamily="18" charset="0"/>
                 <a:cs typeface="Times New Roman" pitchFamily="18" charset="0"/>
               </a:rPr>
-              <a:t>advantages in cost-effectiveness, efficiency, safety, accessibility, versatility, and accuracy make it an indispensable tool in modern research and development</a:t>
-            </a:r>
-            <a:r>
-              <a:rPr lang="en-US" sz="2400" dirty="0" smtClean="0">
-                <a:latin typeface="Times New Roman" pitchFamily="18" charset="0"/>
-                <a:cs typeface="Times New Roman" pitchFamily="18" charset="0"/>
-              </a:rPr>
-              <a:t>.</a:t>
+              <a:t>Its advantages in cost-effectiveness, efficiency, safety, accessibility, versatility, and accuracy make it an indispensable tool in modern research and development.</a:t>
             </a:r>
           </a:p>
           <a:p>
@@ -11996,18 +11891,11 @@
               <a:buAutoNum type="arabicPeriod"/>
             </a:pPr>
             <a:r>
-              <a:rPr lang="en-US" sz="2400" dirty="0" smtClean="0">
-                <a:latin typeface="Times New Roman" pitchFamily="18" charset="0"/>
-                <a:cs typeface="Times New Roman" pitchFamily="18" charset="0"/>
-              </a:rPr>
-              <a:t>Computational </a:t>
-            </a:r>
-            <a:r>
               <a:rPr lang="en-US" sz="2400" dirty="0">
                 <a:latin typeface="Times New Roman" pitchFamily="18" charset="0"/>
                 <a:cs typeface="Times New Roman" pitchFamily="18" charset="0"/>
               </a:rPr>
-              <a:t>chemistry is not a replacement for experimental studies, but plays an important role in enabling chemists to</a:t>
+              <a:t>Computational chemistry is not a replacement for experimental studies, but plays an important role in enabling chemists to</a:t>
             </a:r>
           </a:p>
           <a:p>
@@ -12018,25 +11906,18 @@
               <a:buNone/>
             </a:pPr>
             <a:r>
-              <a:rPr lang="en-US" sz="2400" b="1" dirty="0" smtClean="0">
+              <a:rPr lang="en-US" sz="2400" b="1" dirty="0">
                 <a:latin typeface="Times New Roman" pitchFamily="18" charset="0"/>
                 <a:cs typeface="Times New Roman" pitchFamily="18" charset="0"/>
               </a:rPr>
               <a:t>Explain</a:t>
             </a:r>
             <a:r>
-              <a:rPr lang="en-US" sz="2400" dirty="0" smtClean="0">
-                <a:latin typeface="Times New Roman" pitchFamily="18" charset="0"/>
-                <a:cs typeface="Times New Roman" pitchFamily="18" charset="0"/>
-              </a:rPr>
-              <a:t>: and </a:t>
-            </a:r>
-            <a:r>
               <a:rPr lang="en-US" sz="2400" dirty="0">
                 <a:latin typeface="Times New Roman" pitchFamily="18" charset="0"/>
                 <a:cs typeface="Times New Roman" pitchFamily="18" charset="0"/>
               </a:rPr>
-              <a:t>rationalize known chemistry.</a:t>
+              <a:t>: and rationalize known chemistry.</a:t>
             </a:r>
           </a:p>
           <a:p>
@@ -12068,7 +11949,7 @@
           <p:cNvPr id="6" name="TextBox 5">
             <a:extLst>
               <a:ext uri="{FF2B5EF4-FFF2-40B4-BE49-F238E27FC236}">
-                <a16:creationId xmlns="" xmlns:a16="http://schemas.microsoft.com/office/drawing/2014/main" id="{06E25783-D005-FF41-BFFD-5EAA1BAEE580}"/>
+                <a16:creationId xmlns:a16="http://schemas.microsoft.com/office/drawing/2014/main" id="{06E25783-D005-FF41-BFFD-5EAA1BAEE580}"/>
               </a:ext>
             </a:extLst>
           </p:cNvPr>
@@ -12092,16 +11973,12 @@
           <a:lstStyle/>
           <a:p>
             <a:r>
-              <a:rPr lang="en-US" sz="2400" dirty="0" smtClean="0">
+              <a:rPr lang="en-US" sz="2400" dirty="0">
                 <a:latin typeface="Times New Roman" pitchFamily="18" charset="0"/>
                 <a:cs typeface="Times New Roman" pitchFamily="18" charset="0"/>
               </a:rPr>
               <a:t>Conclusion</a:t>
             </a:r>
-            <a:endParaRPr lang="en-US" sz="2400" dirty="0">
-              <a:latin typeface="Times New Roman" pitchFamily="18" charset="0"/>
-              <a:cs typeface="Times New Roman" pitchFamily="18" charset="0"/>
-            </a:endParaRPr>
           </a:p>
         </p:txBody>
       </p:sp>
@@ -12140,7 +12017,7 @@
           <p:cNvPr id="22" name="Rectangle 21">
             <a:extLst>
               <a:ext uri="{FF2B5EF4-FFF2-40B4-BE49-F238E27FC236}">
-                <a16:creationId xmlns="" xmlns:a16="http://schemas.microsoft.com/office/drawing/2014/main" id="{620A7DEA-950C-4954-B3B7-2672370FABF4}"/>
+                <a16:creationId xmlns:a16="http://schemas.microsoft.com/office/drawing/2014/main" id="{620A7DEA-950C-4954-B3B7-2672370FABF4}"/>
               </a:ext>
             </a:extLst>
           </p:cNvPr>
@@ -12163,13 +12040,13 @@
           <a:lstStyle/>
           <a:p>
             <a:r>
-              <a:rPr lang="en-US" sz="3600" b="1" dirty="0" smtClean="0"/>
+              <a:rPr lang="en-US" sz="3600" b="1" dirty="0"/>
               <a:t>ENGINEERING CHEMISTRY </a:t>
             </a:r>
           </a:p>
           <a:p>
             <a:r>
-              <a:rPr lang="en-IN" sz="2400" b="1" dirty="0" smtClean="0">
+              <a:rPr lang="en-IN" sz="2400" b="1" dirty="0">
                 <a:solidFill>
                   <a:srgbClr val="C00000"/>
                 </a:solidFill>
@@ -12179,7 +12056,7 @@
               <a:t>Module I- </a:t>
             </a:r>
             <a:r>
-              <a:rPr lang="en-US" sz="2400" b="1" dirty="0" smtClean="0">
+              <a:rPr lang="en-US" sz="2400" b="1" dirty="0">
                 <a:solidFill>
                   <a:srgbClr val="C00000"/>
                 </a:solidFill>
@@ -12201,7 +12078,7 @@
           <p:cNvPr id="8" name="Straight Connector 7">
             <a:extLst>
               <a:ext uri="{FF2B5EF4-FFF2-40B4-BE49-F238E27FC236}">
-                <a16:creationId xmlns="" xmlns:a16="http://schemas.microsoft.com/office/drawing/2014/main" id="{A4293697-6E2C-4331-B4E1-C58B355192F4}"/>
+                <a16:creationId xmlns:a16="http://schemas.microsoft.com/office/drawing/2014/main" id="{A4293697-6E2C-4331-B4E1-C58B355192F4}"/>
               </a:ext>
             </a:extLst>
           </p:cNvPr>
@@ -12244,7 +12121,7 @@
           <p:cNvPr id="11" name="Content Placeholder 2">
             <a:extLst>
               <a:ext uri="{FF2B5EF4-FFF2-40B4-BE49-F238E27FC236}">
-                <a16:creationId xmlns="" xmlns:a16="http://schemas.microsoft.com/office/drawing/2014/main" id="{787699B9-5CB5-40FD-8FAC-FD2F47357BDD}"/>
+                <a16:creationId xmlns:a16="http://schemas.microsoft.com/office/drawing/2014/main" id="{787699B9-5CB5-40FD-8FAC-FD2F47357BDD}"/>
               </a:ext>
             </a:extLst>
           </p:cNvPr>
@@ -12268,7 +12145,7 @@
           <a:lstStyle/>
           <a:p>
             <a:r>
-              <a:rPr lang="en-US" sz="2400" dirty="0" smtClean="0">
+              <a:rPr lang="en-US" sz="2400" dirty="0">
                 <a:latin typeface="Times New Roman" pitchFamily="18" charset="0"/>
                 <a:cs typeface="Times New Roman" pitchFamily="18" charset="0"/>
               </a:rPr>
@@ -12277,7 +12154,7 @@
           </a:p>
           <a:p>
             <a:r>
-              <a:rPr lang="en-US" sz="2400" dirty="0" smtClean="0">
+              <a:rPr lang="en-US" sz="2400" dirty="0">
                 <a:latin typeface="Times New Roman" pitchFamily="18" charset="0"/>
                 <a:cs typeface="Times New Roman" pitchFamily="18" charset="0"/>
               </a:rPr>
@@ -12286,7 +12163,7 @@
           </a:p>
           <a:p>
             <a:r>
-              <a:rPr lang="en-US" sz="2400" dirty="0" smtClean="0">
+              <a:rPr lang="en-US" sz="2400" dirty="0">
                 <a:latin typeface="Times New Roman" pitchFamily="18" charset="0"/>
                 <a:cs typeface="Times New Roman" pitchFamily="18" charset="0"/>
               </a:rPr>
@@ -12359,7 +12236,7 @@
           <p:cNvPr id="14" name="Straight Connector 13">
             <a:extLst>
               <a:ext uri="{FF2B5EF4-FFF2-40B4-BE49-F238E27FC236}">
-                <a16:creationId xmlns:a16="http://schemas.microsoft.com/office/drawing/2014/main" xmlns="" id="{44FD96A8-0571-4828-AA94-7DB93A4857C5}"/>
+                <a16:creationId xmlns:a16="http://schemas.microsoft.com/office/drawing/2014/main" id="{44FD96A8-0571-4828-AA94-7DB93A4857C5}"/>
               </a:ext>
             </a:extLst>
           </p:cNvPr>
@@ -12402,7 +12279,7 @@
           <p:cNvPr id="17" name="Rectangle 16">
             <a:extLst>
               <a:ext uri="{FF2B5EF4-FFF2-40B4-BE49-F238E27FC236}">
-                <a16:creationId xmlns:a16="http://schemas.microsoft.com/office/drawing/2014/main" xmlns="" id="{62AC1A6C-10C2-4695-9224-09DA1B0D5932}"/>
+                <a16:creationId xmlns:a16="http://schemas.microsoft.com/office/drawing/2014/main" id="{62AC1A6C-10C2-4695-9224-09DA1B0D5932}"/>
               </a:ext>
             </a:extLst>
           </p:cNvPr>
@@ -12437,7 +12314,7 @@
           <p:cNvPr id="2" name="Group 22">
             <a:extLst>
               <a:ext uri="{FF2B5EF4-FFF2-40B4-BE49-F238E27FC236}">
-                <a16:creationId xmlns:a16="http://schemas.microsoft.com/office/drawing/2014/main" xmlns="" id="{6DD8DCC0-549E-48DB-8CCA-E3FF8FBDEBF0}"/>
+                <a16:creationId xmlns:a16="http://schemas.microsoft.com/office/drawing/2014/main" id="{6DD8DCC0-549E-48DB-8CCA-E3FF8FBDEBF0}"/>
               </a:ext>
             </a:extLst>
           </p:cNvPr>
@@ -12463,7 +12340,7 @@
             <p:cNvPr id="24" name="Rectangle 23">
               <a:extLst>
                 <a:ext uri="{FF2B5EF4-FFF2-40B4-BE49-F238E27FC236}">
-                  <a16:creationId xmlns:a16="http://schemas.microsoft.com/office/drawing/2014/main" xmlns="" id="{B895392A-2454-40A6-9F7C-BC20D3A463EB}"/>
+                  <a16:creationId xmlns:a16="http://schemas.microsoft.com/office/drawing/2014/main" id="{B895392A-2454-40A6-9F7C-BC20D3A463EB}"/>
                 </a:ext>
               </a:extLst>
             </p:cNvPr>
@@ -12513,7 +12390,7 @@
             <p:cNvPr id="25" name="Rectangle 24">
               <a:extLst>
                 <a:ext uri="{FF2B5EF4-FFF2-40B4-BE49-F238E27FC236}">
-                  <a16:creationId xmlns:a16="http://schemas.microsoft.com/office/drawing/2014/main" xmlns="" id="{DC7604FF-DE88-44B6-A0D9-723028500B8B}"/>
+                  <a16:creationId xmlns:a16="http://schemas.microsoft.com/office/drawing/2014/main" id="{DC7604FF-DE88-44B6-A0D9-723028500B8B}"/>
                 </a:ext>
               </a:extLst>
             </p:cNvPr>
@@ -12563,7 +12440,7 @@
             <p:cNvPr id="26" name="Rectangle 25">
               <a:extLst>
                 <a:ext uri="{FF2B5EF4-FFF2-40B4-BE49-F238E27FC236}">
-                  <a16:creationId xmlns:a16="http://schemas.microsoft.com/office/drawing/2014/main" xmlns="" id="{35F4DC18-13F2-43D2-9B15-157998AF1875}"/>
+                  <a16:creationId xmlns:a16="http://schemas.microsoft.com/office/drawing/2014/main" id="{35F4DC18-13F2-43D2-9B15-157998AF1875}"/>
                 </a:ext>
               </a:extLst>
             </p:cNvPr>
@@ -12613,7 +12490,7 @@
             <p:cNvPr id="27" name="Rectangle 26">
               <a:extLst>
                 <a:ext uri="{FF2B5EF4-FFF2-40B4-BE49-F238E27FC236}">
-                  <a16:creationId xmlns:a16="http://schemas.microsoft.com/office/drawing/2014/main" xmlns="" id="{34375A76-1BF8-4628-B0FE-78E1BEB569B2}"/>
+                  <a16:creationId xmlns:a16="http://schemas.microsoft.com/office/drawing/2014/main" id="{34375A76-1BF8-4628-B0FE-78E1BEB569B2}"/>
                 </a:ext>
               </a:extLst>
             </p:cNvPr>
@@ -12664,7 +12541,7 @@
           <p:cNvPr id="19" name="Rectangle 18">
             <a:extLst>
               <a:ext uri="{FF2B5EF4-FFF2-40B4-BE49-F238E27FC236}">
-                <a16:creationId xmlns:a16="http://schemas.microsoft.com/office/drawing/2014/main" xmlns="" id="{A6945700-3E62-4469-A35D-2B3AE23A08DF}"/>
+                <a16:creationId xmlns:a16="http://schemas.microsoft.com/office/drawing/2014/main" id="{A6945700-3E62-4469-A35D-2B3AE23A08DF}"/>
               </a:ext>
             </a:extLst>
           </p:cNvPr>
@@ -12770,7 +12647,7 @@
           <p:cNvPr id="8" name="Straight Connector 7">
             <a:extLst>
               <a:ext uri="{FF2B5EF4-FFF2-40B4-BE49-F238E27FC236}">
-                <a16:creationId xmlns="" xmlns:a16="http://schemas.microsoft.com/office/drawing/2014/main" id="{A4293697-6E2C-4331-B4E1-C58B355192F4}"/>
+                <a16:creationId xmlns:a16="http://schemas.microsoft.com/office/drawing/2014/main" id="{A4293697-6E2C-4331-B4E1-C58B355192F4}"/>
               </a:ext>
             </a:extLst>
           </p:cNvPr>
@@ -12813,7 +12690,7 @@
           <p:cNvPr id="9" name="Content Placeholder 2">
             <a:extLst>
               <a:ext uri="{FF2B5EF4-FFF2-40B4-BE49-F238E27FC236}">
-                <a16:creationId xmlns="" xmlns:a16="http://schemas.microsoft.com/office/drawing/2014/main" id="{B1AEBD28-7BCD-4BFF-8D86-9C5F49398112}"/>
+                <a16:creationId xmlns:a16="http://schemas.microsoft.com/office/drawing/2014/main" id="{B1AEBD28-7BCD-4BFF-8D86-9C5F49398112}"/>
               </a:ext>
             </a:extLst>
           </p:cNvPr>
@@ -12852,7 +12729,7 @@
           <p:cNvPr id="7" name="Rectangle 6">
             <a:extLst>
               <a:ext uri="{FF2B5EF4-FFF2-40B4-BE49-F238E27FC236}">
-                <a16:creationId xmlns="" xmlns:a16="http://schemas.microsoft.com/office/drawing/2014/main" id="{620A7DEA-950C-4954-B3B7-2672370FABF4}"/>
+                <a16:creationId xmlns:a16="http://schemas.microsoft.com/office/drawing/2014/main" id="{620A7DEA-950C-4954-B3B7-2672370FABF4}"/>
               </a:ext>
             </a:extLst>
           </p:cNvPr>
@@ -12875,13 +12752,13 @@
           <a:lstStyle/>
           <a:p>
             <a:r>
-              <a:rPr lang="en-US" sz="3600" b="1" dirty="0" smtClean="0"/>
+              <a:rPr lang="en-US" sz="3600" b="1" dirty="0"/>
               <a:t>ENGINEERING CHEMISTRY </a:t>
             </a:r>
           </a:p>
           <a:p>
             <a:r>
-              <a:rPr lang="en-IN" sz="2400" b="1" dirty="0" smtClean="0">
+              <a:rPr lang="en-IN" sz="2400" b="1" dirty="0">
                 <a:solidFill>
                   <a:srgbClr val="C00000"/>
                 </a:solidFill>
@@ -12891,7 +12768,7 @@
               <a:t>Module I- </a:t>
             </a:r>
             <a:r>
-              <a:rPr lang="en-US" sz="2400" b="1" dirty="0" smtClean="0">
+              <a:rPr lang="en-US" sz="2400" b="1" dirty="0">
                 <a:solidFill>
                   <a:srgbClr val="C00000"/>
                 </a:solidFill>
@@ -12939,7 +12816,7 @@
           <p:cNvPr id="11" name="Picture 2" descr="Role of Computational Methods in Modern Chemistry">
             <a:extLst>
               <a:ext uri="{FF2B5EF4-FFF2-40B4-BE49-F238E27FC236}">
-                <a16:creationId xmlns="" xmlns:a16="http://schemas.microsoft.com/office/drawing/2014/main" id="{52C98056-5DB6-FE97-0177-BDDBAF728F23}"/>
+                <a16:creationId xmlns:a16="http://schemas.microsoft.com/office/drawing/2014/main" id="{52C98056-5DB6-FE97-0177-BDDBAF728F23}"/>
               </a:ext>
             </a:extLst>
           </p:cNvPr>
@@ -13002,7 +12879,7 @@
           <a:lstStyle/>
           <a:p>
             <a:r>
-              <a:rPr lang="en-US" sz="2400" b="1" dirty="0" smtClean="0">
+              <a:rPr lang="en-US" sz="2400" b="1" dirty="0">
                 <a:latin typeface="Times New Roman" pitchFamily="18" charset="0"/>
                 <a:cs typeface="Times New Roman" pitchFamily="18" charset="0"/>
               </a:rPr>
@@ -13010,14 +12887,14 @@
             </a:r>
           </a:p>
           <a:p>
-            <a:endParaRPr lang="en-US" sz="2400" b="1" dirty="0" smtClean="0">
+            <a:endParaRPr lang="en-US" sz="2400" b="1" dirty="0">
               <a:latin typeface="Times New Roman" pitchFamily="18" charset="0"/>
               <a:cs typeface="Times New Roman" pitchFamily="18" charset="0"/>
             </a:endParaRPr>
           </a:p>
           <a:p>
             <a:r>
-              <a:rPr lang="en-US" sz="2400" dirty="0" smtClean="0">
+              <a:rPr lang="en-US" sz="2400" dirty="0">
                 <a:latin typeface="Times New Roman" pitchFamily="18" charset="0"/>
                 <a:cs typeface="Times New Roman" pitchFamily="18" charset="0"/>
               </a:rPr>
@@ -13025,14 +12902,14 @@
             </a:r>
           </a:p>
           <a:p>
-            <a:endParaRPr lang="en-US" sz="2400" dirty="0" smtClean="0">
+            <a:endParaRPr lang="en-US" sz="2400" dirty="0">
               <a:latin typeface="Times New Roman" pitchFamily="18" charset="0"/>
               <a:cs typeface="Times New Roman" pitchFamily="18" charset="0"/>
             </a:endParaRPr>
           </a:p>
           <a:p>
             <a:r>
-              <a:rPr lang="en-US" sz="2400" dirty="0" smtClean="0">
+              <a:rPr lang="en-US" sz="2400" dirty="0">
                 <a:latin typeface="Times New Roman" pitchFamily="18" charset="0"/>
                 <a:cs typeface="Times New Roman" pitchFamily="18" charset="0"/>
               </a:rPr>
@@ -13040,37 +12917,33 @@
             </a:r>
           </a:p>
           <a:p>
-            <a:endParaRPr lang="en-US" sz="2400" dirty="0" smtClean="0">
+            <a:endParaRPr lang="en-US" sz="2400" dirty="0">
               <a:latin typeface="Times New Roman" pitchFamily="18" charset="0"/>
               <a:cs typeface="Times New Roman" pitchFamily="18" charset="0"/>
             </a:endParaRPr>
           </a:p>
           <a:p>
             <a:r>
-              <a:rPr lang="en-US" sz="2400" dirty="0" smtClean="0">
+              <a:rPr lang="en-US" sz="2400" dirty="0">
                 <a:latin typeface="Times New Roman" pitchFamily="18" charset="0"/>
                 <a:cs typeface="Times New Roman" pitchFamily="18" charset="0"/>
               </a:rPr>
               <a:t>The first theoretical investigation was done by Walter </a:t>
             </a:r>
             <a:r>
-              <a:rPr lang="en-US" sz="2400" dirty="0" err="1" smtClean="0">
+              <a:rPr lang="en-US" sz="2400" dirty="0" err="1">
                 <a:latin typeface="Times New Roman" pitchFamily="18" charset="0"/>
                 <a:cs typeface="Times New Roman" pitchFamily="18" charset="0"/>
               </a:rPr>
               <a:t>Heitler</a:t>
             </a:r>
             <a:r>
-              <a:rPr lang="en-US" sz="2400" dirty="0" smtClean="0">
+              <a:rPr lang="en-US" sz="2400" dirty="0">
                 <a:latin typeface="Times New Roman" pitchFamily="18" charset="0"/>
                 <a:cs typeface="Times New Roman" pitchFamily="18" charset="0"/>
               </a:rPr>
               <a:t> and Fritz London in 1927</a:t>
             </a:r>
-            <a:endParaRPr lang="en-US" sz="2400" dirty="0">
-              <a:latin typeface="Times New Roman" pitchFamily="18" charset="0"/>
-              <a:cs typeface="Times New Roman" pitchFamily="18" charset="0"/>
-            </a:endParaRPr>
           </a:p>
         </p:txBody>
       </p:sp>
@@ -13109,7 +12982,7 @@
           <p:cNvPr id="22" name="Rectangle 21">
             <a:extLst>
               <a:ext uri="{FF2B5EF4-FFF2-40B4-BE49-F238E27FC236}">
-                <a16:creationId xmlns="" xmlns:a16="http://schemas.microsoft.com/office/drawing/2014/main" id="{620A7DEA-950C-4954-B3B7-2672370FABF4}"/>
+                <a16:creationId xmlns:a16="http://schemas.microsoft.com/office/drawing/2014/main" id="{620A7DEA-950C-4954-B3B7-2672370FABF4}"/>
               </a:ext>
             </a:extLst>
           </p:cNvPr>
@@ -13132,13 +13005,13 @@
           <a:lstStyle/>
           <a:p>
             <a:r>
-              <a:rPr lang="en-US" sz="3600" b="1" dirty="0" smtClean="0"/>
+              <a:rPr lang="en-US" sz="3600" b="1" dirty="0"/>
               <a:t>ENGINEERING CHEMISTRY </a:t>
             </a:r>
           </a:p>
           <a:p>
             <a:r>
-              <a:rPr lang="en-IN" sz="2400" b="1" dirty="0" smtClean="0">
+              <a:rPr lang="en-IN" sz="2400" b="1" dirty="0">
                 <a:solidFill>
                   <a:srgbClr val="C00000"/>
                 </a:solidFill>
@@ -13148,7 +13021,7 @@
               <a:t>Module I- </a:t>
             </a:r>
             <a:r>
-              <a:rPr lang="en-US" sz="2400" b="1" dirty="0" smtClean="0">
+              <a:rPr lang="en-US" sz="2400" b="1" dirty="0">
                 <a:solidFill>
                   <a:srgbClr val="C00000"/>
                 </a:solidFill>
@@ -13170,7 +13043,7 @@
           <p:cNvPr id="8" name="Straight Connector 7">
             <a:extLst>
               <a:ext uri="{FF2B5EF4-FFF2-40B4-BE49-F238E27FC236}">
-                <a16:creationId xmlns="" xmlns:a16="http://schemas.microsoft.com/office/drawing/2014/main" id="{A4293697-6E2C-4331-B4E1-C58B355192F4}"/>
+                <a16:creationId xmlns:a16="http://schemas.microsoft.com/office/drawing/2014/main" id="{A4293697-6E2C-4331-B4E1-C58B355192F4}"/>
               </a:ext>
             </a:extLst>
           </p:cNvPr>
@@ -13239,7 +13112,7 @@
           <p:cNvPr id="9" name="Content Placeholder 3">
             <a:extLst>
               <a:ext uri="{FF2B5EF4-FFF2-40B4-BE49-F238E27FC236}">
-                <a16:creationId xmlns="" xmlns:a16="http://schemas.microsoft.com/office/drawing/2014/main" id="{D4C71450-6A07-9304-3BC9-EE09E556D089}"/>
+                <a16:creationId xmlns:a16="http://schemas.microsoft.com/office/drawing/2014/main" id="{D4C71450-6A07-9304-3BC9-EE09E556D089}"/>
               </a:ext>
             </a:extLst>
           </p:cNvPr>
@@ -13286,7 +13159,7 @@
           <a:lstStyle/>
           <a:p>
             <a:r>
-              <a:rPr lang="en-US" sz="2400" b="1" dirty="0" smtClean="0">
+              <a:rPr lang="en-US" sz="2400" b="1" dirty="0">
                 <a:latin typeface="Times New Roman" pitchFamily="18" charset="0"/>
                 <a:cs typeface="Times New Roman" pitchFamily="18" charset="0"/>
               </a:rPr>
@@ -13295,14 +13168,14 @@
           </a:p>
           <a:p>
             <a:r>
-              <a:rPr lang="en-US" sz="2400" b="1" dirty="0" smtClean="0">
+              <a:rPr lang="en-US" sz="2400" b="1" dirty="0">
                 <a:latin typeface="Times New Roman" pitchFamily="18" charset="0"/>
                 <a:cs typeface="Times New Roman" pitchFamily="18" charset="0"/>
               </a:rPr>
               <a:t>Walter Kohn : </a:t>
             </a:r>
             <a:r>
-              <a:rPr lang="en-US" sz="2400" dirty="0" smtClean="0">
+              <a:rPr lang="en-US" sz="2400" dirty="0">
                 <a:latin typeface="Times New Roman" pitchFamily="18" charset="0"/>
                 <a:cs typeface="Times New Roman" pitchFamily="18" charset="0"/>
               </a:rPr>
@@ -13311,34 +13184,34 @@
           </a:p>
           <a:p>
             <a:r>
-              <a:rPr lang="en-US" sz="2400" b="1" dirty="0" smtClean="0">
+              <a:rPr lang="en-US" sz="2400" b="1" dirty="0">
                 <a:latin typeface="Times New Roman" pitchFamily="18" charset="0"/>
                 <a:cs typeface="Times New Roman" pitchFamily="18" charset="0"/>
               </a:rPr>
               <a:t>John A. </a:t>
             </a:r>
             <a:r>
-              <a:rPr lang="en-US" sz="2400" b="1" dirty="0" err="1" smtClean="0">
+              <a:rPr lang="en-US" sz="2400" b="1" dirty="0" err="1">
                 <a:latin typeface="Times New Roman" pitchFamily="18" charset="0"/>
                 <a:cs typeface="Times New Roman" pitchFamily="18" charset="0"/>
               </a:rPr>
               <a:t>Pople</a:t>
             </a:r>
             <a:r>
-              <a:rPr lang="en-US" sz="2400" b="1" dirty="0" smtClean="0">
+              <a:rPr lang="en-US" sz="2400" b="1" dirty="0">
                 <a:latin typeface="Times New Roman" pitchFamily="18" charset="0"/>
                 <a:cs typeface="Times New Roman" pitchFamily="18" charset="0"/>
               </a:rPr>
               <a:t> : </a:t>
             </a:r>
             <a:r>
-              <a:rPr lang="en-US" sz="2400" dirty="0" smtClean="0">
+              <a:rPr lang="en-US" sz="2400" dirty="0">
                 <a:latin typeface="Times New Roman" pitchFamily="18" charset="0"/>
                 <a:cs typeface="Times New Roman" pitchFamily="18" charset="0"/>
               </a:rPr>
               <a:t>For the development of computational methods in quantum chemistry.</a:t>
             </a:r>
-            <a:endParaRPr lang="en-US" sz="2400" b="1" dirty="0" smtClean="0">
+            <a:endParaRPr lang="en-US" sz="2400" b="1" dirty="0">
               <a:latin typeface="Times New Roman" pitchFamily="18" charset="0"/>
               <a:cs typeface="Times New Roman" pitchFamily="18" charset="0"/>
             </a:endParaRPr>
@@ -13383,7 +13256,7 @@
           <p:cNvPr id="22" name="Rectangle 21">
             <a:extLst>
               <a:ext uri="{FF2B5EF4-FFF2-40B4-BE49-F238E27FC236}">
-                <a16:creationId xmlns="" xmlns:a16="http://schemas.microsoft.com/office/drawing/2014/main" id="{620A7DEA-950C-4954-B3B7-2672370FABF4}"/>
+                <a16:creationId xmlns:a16="http://schemas.microsoft.com/office/drawing/2014/main" id="{620A7DEA-950C-4954-B3B7-2672370FABF4}"/>
               </a:ext>
             </a:extLst>
           </p:cNvPr>
@@ -13406,13 +13279,13 @@
           <a:lstStyle/>
           <a:p>
             <a:r>
-              <a:rPr lang="en-US" sz="3600" b="1" dirty="0" smtClean="0"/>
+              <a:rPr lang="en-US" sz="3600" b="1" dirty="0"/>
               <a:t>ENGINEERING CHEMISTRY </a:t>
             </a:r>
           </a:p>
           <a:p>
             <a:r>
-              <a:rPr lang="en-IN" sz="2400" b="1" dirty="0" smtClean="0">
+              <a:rPr lang="en-IN" sz="2400" b="1" dirty="0">
                 <a:solidFill>
                   <a:srgbClr val="C00000"/>
                 </a:solidFill>
@@ -13422,7 +13295,7 @@
               <a:t>Module I- </a:t>
             </a:r>
             <a:r>
-              <a:rPr lang="en-US" sz="2400" b="1" dirty="0" smtClean="0">
+              <a:rPr lang="en-US" sz="2400" b="1" dirty="0">
                 <a:solidFill>
                   <a:srgbClr val="C00000"/>
                 </a:solidFill>
@@ -13444,7 +13317,7 @@
           <p:cNvPr id="8" name="Straight Connector 7">
             <a:extLst>
               <a:ext uri="{FF2B5EF4-FFF2-40B4-BE49-F238E27FC236}">
-                <a16:creationId xmlns="" xmlns:a16="http://schemas.microsoft.com/office/drawing/2014/main" id="{A4293697-6E2C-4331-B4E1-C58B355192F4}"/>
+                <a16:creationId xmlns:a16="http://schemas.microsoft.com/office/drawing/2014/main" id="{A4293697-6E2C-4331-B4E1-C58B355192F4}"/>
               </a:ext>
             </a:extLst>
           </p:cNvPr>
@@ -13513,7 +13386,7 @@
           <p:cNvPr id="9" name="Picture 8">
             <a:extLst>
               <a:ext uri="{FF2B5EF4-FFF2-40B4-BE49-F238E27FC236}">
-                <a16:creationId xmlns="" xmlns:a16="http://schemas.microsoft.com/office/drawing/2014/main" id="{AFE48292-CF30-C076-7060-42487D4C0349}"/>
+                <a16:creationId xmlns:a16="http://schemas.microsoft.com/office/drawing/2014/main" id="{AFE48292-CF30-C076-7060-42487D4C0349}"/>
               </a:ext>
             </a:extLst>
           </p:cNvPr>
@@ -13560,7 +13433,7 @@
           <a:lstStyle/>
           <a:p>
             <a:r>
-              <a:rPr lang="en-US" sz="2400" b="1" dirty="0" smtClean="0">
+              <a:rPr lang="en-US" sz="2400" b="1" dirty="0">
                 <a:latin typeface="Times New Roman" pitchFamily="18" charset="0"/>
                 <a:cs typeface="Times New Roman" pitchFamily="18" charset="0"/>
               </a:rPr>
@@ -13569,16 +13442,12 @@
           </a:p>
           <a:p>
             <a:r>
-              <a:rPr lang="en-US" sz="2400" dirty="0" smtClean="0">
+              <a:rPr lang="en-US" sz="2400" dirty="0">
                 <a:latin typeface="Times New Roman" pitchFamily="18" charset="0"/>
                 <a:cs typeface="Times New Roman" pitchFamily="18" charset="0"/>
               </a:rPr>
               <a:t>For the development of computer based methods to model complex systems.</a:t>
             </a:r>
-            <a:endParaRPr lang="en-US" sz="2400" dirty="0">
-              <a:latin typeface="Times New Roman" pitchFamily="18" charset="0"/>
-              <a:cs typeface="Times New Roman" pitchFamily="18" charset="0"/>
-            </a:endParaRPr>
           </a:p>
         </p:txBody>
       </p:sp>
@@ -13617,7 +13486,7 @@
           <p:cNvPr id="22" name="Rectangle 21">
             <a:extLst>
               <a:ext uri="{FF2B5EF4-FFF2-40B4-BE49-F238E27FC236}">
-                <a16:creationId xmlns="" xmlns:a16="http://schemas.microsoft.com/office/drawing/2014/main" id="{620A7DEA-950C-4954-B3B7-2672370FABF4}"/>
+                <a16:creationId xmlns:a16="http://schemas.microsoft.com/office/drawing/2014/main" id="{620A7DEA-950C-4954-B3B7-2672370FABF4}"/>
               </a:ext>
             </a:extLst>
           </p:cNvPr>
@@ -13640,13 +13509,13 @@
           <a:lstStyle/>
           <a:p>
             <a:r>
-              <a:rPr lang="en-US" sz="3600" b="1" dirty="0" smtClean="0"/>
+              <a:rPr lang="en-US" sz="3600" b="1" dirty="0"/>
               <a:t>ENGINEERING CHEMISTRY </a:t>
             </a:r>
           </a:p>
           <a:p>
             <a:r>
-              <a:rPr lang="en-IN" sz="2400" b="1" dirty="0" smtClean="0">
+              <a:rPr lang="en-IN" sz="2400" b="1" dirty="0">
                 <a:solidFill>
                   <a:srgbClr val="C00000"/>
                 </a:solidFill>
@@ -13656,7 +13525,7 @@
               <a:t>Module I- </a:t>
             </a:r>
             <a:r>
-              <a:rPr lang="en-US" sz="2400" b="1" dirty="0" smtClean="0">
+              <a:rPr lang="en-US" sz="2400" b="1" dirty="0">
                 <a:solidFill>
                   <a:srgbClr val="C00000"/>
                 </a:solidFill>
@@ -13678,7 +13547,7 @@
           <p:cNvPr id="8" name="Straight Connector 7">
             <a:extLst>
               <a:ext uri="{FF2B5EF4-FFF2-40B4-BE49-F238E27FC236}">
-                <a16:creationId xmlns="" xmlns:a16="http://schemas.microsoft.com/office/drawing/2014/main" id="{A4293697-6E2C-4331-B4E1-C58B355192F4}"/>
+                <a16:creationId xmlns:a16="http://schemas.microsoft.com/office/drawing/2014/main" id="{A4293697-6E2C-4331-B4E1-C58B355192F4}"/>
               </a:ext>
             </a:extLst>
           </p:cNvPr>
@@ -13764,7 +13633,7 @@
           <a:lstStyle/>
           <a:p>
             <a:r>
-              <a:rPr lang="en-US" sz="2400" b="1" dirty="0" smtClean="0">
+              <a:rPr lang="en-US" sz="2400" b="1" dirty="0">
                 <a:latin typeface="Times New Roman" pitchFamily="18" charset="0"/>
                 <a:cs typeface="Times New Roman" pitchFamily="18" charset="0"/>
               </a:rPr>
@@ -13773,7 +13642,7 @@
           </a:p>
           <a:p>
             <a:r>
-              <a:rPr lang="en-US" sz="2400" dirty="0" smtClean="0">
+              <a:rPr lang="en-US" sz="2400" dirty="0">
                 <a:latin typeface="Times New Roman" pitchFamily="18" charset="0"/>
                 <a:cs typeface="Times New Roman" pitchFamily="18" charset="0"/>
               </a:rPr>
@@ -13781,20 +13650,20 @@
             </a:r>
           </a:p>
           <a:p>
-            <a:endParaRPr lang="en-US" sz="2400" dirty="0" smtClean="0">
+            <a:endParaRPr lang="en-US" sz="2400" dirty="0">
               <a:latin typeface="Times New Roman" pitchFamily="18" charset="0"/>
               <a:cs typeface="Times New Roman" pitchFamily="18" charset="0"/>
             </a:endParaRPr>
           </a:p>
           <a:p>
-            <a:endParaRPr lang="en-US" sz="2400" dirty="0" smtClean="0">
+            <a:endParaRPr lang="en-US" sz="2400" dirty="0">
               <a:latin typeface="Times New Roman" pitchFamily="18" charset="0"/>
               <a:cs typeface="Times New Roman" pitchFamily="18" charset="0"/>
             </a:endParaRPr>
           </a:p>
           <a:p>
             <a:r>
-              <a:rPr lang="en-US" sz="2400" b="1" dirty="0" smtClean="0">
+              <a:rPr lang="en-US" sz="2400" b="1" dirty="0">
                 <a:latin typeface="Times New Roman" pitchFamily="18" charset="0"/>
                 <a:cs typeface="Times New Roman" pitchFamily="18" charset="0"/>
               </a:rPr>
@@ -13802,7 +13671,7 @@
             </a:r>
           </a:p>
           <a:p>
-            <a:endParaRPr lang="en-US" sz="2400" b="1" dirty="0" smtClean="0">
+            <a:endParaRPr lang="en-US" sz="2400" b="1" dirty="0">
               <a:latin typeface="Times New Roman" pitchFamily="18" charset="0"/>
               <a:cs typeface="Times New Roman" pitchFamily="18" charset="0"/>
             </a:endParaRPr>
@@ -13813,7 +13682,7 @@
               <a:buChar char="Ø"/>
             </a:pPr>
             <a:r>
-              <a:rPr lang="en-US" sz="2400" dirty="0" smtClean="0">
+              <a:rPr lang="en-US" sz="2400" dirty="0">
                 <a:latin typeface="Times New Roman" pitchFamily="18" charset="0"/>
                 <a:cs typeface="Times New Roman" pitchFamily="18" charset="0"/>
               </a:rPr>
@@ -13826,7 +13695,7 @@
               <a:buChar char="Ø"/>
             </a:pPr>
             <a:r>
-              <a:rPr lang="en-US" sz="2400" dirty="0" smtClean="0">
+              <a:rPr lang="en-US" sz="2400" dirty="0">
                 <a:latin typeface="Times New Roman" pitchFamily="18" charset="0"/>
                 <a:cs typeface="Times New Roman" pitchFamily="18" charset="0"/>
               </a:rPr>
@@ -13839,7 +13708,7 @@
               <a:buChar char="Ø"/>
             </a:pPr>
             <a:r>
-              <a:rPr lang="en-US" sz="2400" dirty="0" smtClean="0">
+              <a:rPr lang="en-US" sz="2400" dirty="0">
                 <a:latin typeface="Times New Roman" pitchFamily="18" charset="0"/>
                 <a:cs typeface="Times New Roman" pitchFamily="18" charset="0"/>
               </a:rPr>
@@ -13847,43 +13716,43 @@
             </a:r>
           </a:p>
           <a:p>
-            <a:endParaRPr lang="en-US" sz="2400" dirty="0" smtClean="0">
+            <a:endParaRPr lang="en-US" sz="2400" dirty="0">
               <a:latin typeface="Times New Roman" pitchFamily="18" charset="0"/>
               <a:cs typeface="Times New Roman" pitchFamily="18" charset="0"/>
             </a:endParaRPr>
           </a:p>
           <a:p>
-            <a:endParaRPr lang="en-US" sz="2400" dirty="0" smtClean="0">
+            <a:endParaRPr lang="en-US" sz="2400" dirty="0">
               <a:latin typeface="Times New Roman" pitchFamily="18" charset="0"/>
               <a:cs typeface="Times New Roman" pitchFamily="18" charset="0"/>
             </a:endParaRPr>
           </a:p>
           <a:p>
-            <a:endParaRPr lang="en-US" sz="2400" dirty="0" smtClean="0">
+            <a:endParaRPr lang="en-US" sz="2400" dirty="0">
               <a:latin typeface="Times New Roman" pitchFamily="18" charset="0"/>
               <a:cs typeface="Times New Roman" pitchFamily="18" charset="0"/>
             </a:endParaRPr>
           </a:p>
           <a:p>
-            <a:endParaRPr lang="en-US" sz="2400" dirty="0" smtClean="0">
+            <a:endParaRPr lang="en-US" sz="2400" dirty="0">
               <a:latin typeface="Times New Roman" pitchFamily="18" charset="0"/>
               <a:cs typeface="Times New Roman" pitchFamily="18" charset="0"/>
             </a:endParaRPr>
           </a:p>
           <a:p>
-            <a:endParaRPr lang="en-US" sz="2400" dirty="0" smtClean="0">
+            <a:endParaRPr lang="en-US" sz="2400" dirty="0">
               <a:latin typeface="Times New Roman" pitchFamily="18" charset="0"/>
               <a:cs typeface="Times New Roman" pitchFamily="18" charset="0"/>
             </a:endParaRPr>
           </a:p>
           <a:p>
-            <a:endParaRPr lang="en-US" sz="2400" dirty="0" smtClean="0">
+            <a:endParaRPr lang="en-US" sz="2400" dirty="0">
               <a:latin typeface="Times New Roman" pitchFamily="18" charset="0"/>
               <a:cs typeface="Times New Roman" pitchFamily="18" charset="0"/>
             </a:endParaRPr>
           </a:p>
           <a:p>
-            <a:endParaRPr lang="en-US" sz="2400" dirty="0" smtClean="0">
+            <a:endParaRPr lang="en-US" sz="2400" dirty="0">
               <a:latin typeface="Times New Roman" pitchFamily="18" charset="0"/>
               <a:cs typeface="Times New Roman" pitchFamily="18" charset="0"/>
             </a:endParaRPr>
@@ -13931,7 +13800,7 @@
           <p:cNvPr id="22" name="Rectangle 21">
             <a:extLst>
               <a:ext uri="{FF2B5EF4-FFF2-40B4-BE49-F238E27FC236}">
-                <a16:creationId xmlns="" xmlns:a16="http://schemas.microsoft.com/office/drawing/2014/main" id="{620A7DEA-950C-4954-B3B7-2672370FABF4}"/>
+                <a16:creationId xmlns:a16="http://schemas.microsoft.com/office/drawing/2014/main" id="{620A7DEA-950C-4954-B3B7-2672370FABF4}"/>
               </a:ext>
             </a:extLst>
           </p:cNvPr>
@@ -13954,13 +13823,13 @@
           <a:lstStyle/>
           <a:p>
             <a:r>
-              <a:rPr lang="en-US" sz="3600" b="1" dirty="0" smtClean="0"/>
+              <a:rPr lang="en-US" sz="3600" b="1" dirty="0"/>
               <a:t>ENGINEERING CHEMISTRY </a:t>
             </a:r>
           </a:p>
           <a:p>
             <a:r>
-              <a:rPr lang="en-IN" sz="2400" b="1" dirty="0" smtClean="0">
+              <a:rPr lang="en-IN" sz="2400" b="1" dirty="0">
                 <a:solidFill>
                   <a:srgbClr val="C00000"/>
                 </a:solidFill>
@@ -13970,7 +13839,7 @@
               <a:t>Module I- </a:t>
             </a:r>
             <a:r>
-              <a:rPr lang="en-US" sz="2400" b="1" dirty="0" smtClean="0">
+              <a:rPr lang="en-US" sz="2400" b="1" dirty="0">
                 <a:solidFill>
                   <a:srgbClr val="C00000"/>
                 </a:solidFill>
@@ -13992,7 +13861,7 @@
           <p:cNvPr id="8" name="Straight Connector 7">
             <a:extLst>
               <a:ext uri="{FF2B5EF4-FFF2-40B4-BE49-F238E27FC236}">
-                <a16:creationId xmlns="" xmlns:a16="http://schemas.microsoft.com/office/drawing/2014/main" id="{A4293697-6E2C-4331-B4E1-C58B355192F4}"/>
+                <a16:creationId xmlns:a16="http://schemas.microsoft.com/office/drawing/2014/main" id="{A4293697-6E2C-4331-B4E1-C58B355192F4}"/>
               </a:ext>
             </a:extLst>
           </p:cNvPr>
@@ -14061,7 +13930,7 @@
           <p:cNvPr id="5" name="TextBox 4">
             <a:extLst>
               <a:ext uri="{FF2B5EF4-FFF2-40B4-BE49-F238E27FC236}">
-                <a16:creationId xmlns="" xmlns:a16="http://schemas.microsoft.com/office/drawing/2014/main" id="{209FA85C-0805-AE48-BD14-A1EC8CFF9B01}"/>
+                <a16:creationId xmlns:a16="http://schemas.microsoft.com/office/drawing/2014/main" id="{209FA85C-0805-AE48-BD14-A1EC8CFF9B01}"/>
               </a:ext>
             </a:extLst>
           </p:cNvPr>
@@ -14119,19 +13988,12 @@
                 <a:latin typeface="Times New Roman" pitchFamily="18" charset="0"/>
                 <a:cs typeface="Times New Roman" pitchFamily="18" charset="0"/>
               </a:rPr>
-              <a:t>Computational modeling can be used to accurately predict the physical  and chemical properties of molecules, such </a:t>
-            </a:r>
-            <a:r>
-              <a:rPr lang="en-US" sz="2400" dirty="0" smtClean="0">
-                <a:latin typeface="Times New Roman" pitchFamily="18" charset="0"/>
-                <a:cs typeface="Times New Roman" pitchFamily="18" charset="0"/>
-              </a:rPr>
-              <a:t>as</a:t>
-            </a:r>
-          </a:p>
-          <a:p>
-            <a:r>
-              <a:rPr lang="en-US" sz="2400" dirty="0" smtClean="0">
+              <a:t>Computational modeling can be used to accurately predict the physical  and chemical properties of molecules, such as</a:t>
+            </a:r>
+          </a:p>
+          <a:p>
+            <a:r>
+              <a:rPr lang="en-US" sz="2400" dirty="0">
                 <a:latin typeface="Times New Roman" pitchFamily="18" charset="0"/>
                 <a:cs typeface="Times New Roman" pitchFamily="18" charset="0"/>
               </a:rPr>
@@ -14144,23 +14006,12 @@
               <a:buChar char="Ø"/>
             </a:pPr>
             <a:r>
-              <a:rPr lang="en-US" sz="2400" dirty="0" smtClean="0">
-                <a:latin typeface="Times New Roman" pitchFamily="18" charset="0"/>
-                <a:cs typeface="Times New Roman" pitchFamily="18" charset="0"/>
-              </a:rPr>
-              <a:t>Bond </a:t>
-            </a:r>
-            <a:r>
               <a:rPr lang="en-US" sz="2400" dirty="0">
                 <a:latin typeface="Times New Roman" pitchFamily="18" charset="0"/>
                 <a:cs typeface="Times New Roman" pitchFamily="18" charset="0"/>
               </a:rPr>
-              <a:t>lengths, </a:t>
-            </a:r>
-            <a:endParaRPr lang="en-US" sz="2400" dirty="0" smtClean="0">
-              <a:latin typeface="Times New Roman" pitchFamily="18" charset="0"/>
-              <a:cs typeface="Times New Roman" pitchFamily="18" charset="0"/>
-            </a:endParaRPr>
+              <a:t>Bond lengths, </a:t>
+            </a:r>
           </a:p>
           <a:p>
             <a:pPr>
@@ -14168,7 +14019,7 @@
               <a:buChar char="Ø"/>
             </a:pPr>
             <a:r>
-              <a:rPr lang="en-US" sz="2400" dirty="0" smtClean="0">
+              <a:rPr lang="en-US" sz="2400" dirty="0">
                 <a:latin typeface="Times New Roman" pitchFamily="18" charset="0"/>
                 <a:cs typeface="Times New Roman" pitchFamily="18" charset="0"/>
               </a:rPr>
@@ -14181,7 +14032,7 @@
               <a:buChar char="Ø"/>
             </a:pPr>
             <a:r>
-              <a:rPr lang="en-US" sz="2400" dirty="0" smtClean="0">
+              <a:rPr lang="en-US" sz="2400" dirty="0">
                 <a:latin typeface="Times New Roman" pitchFamily="18" charset="0"/>
                 <a:cs typeface="Times New Roman" pitchFamily="18" charset="0"/>
               </a:rPr>
@@ -14194,7 +14045,7 @@
               <a:buChar char="Ø"/>
             </a:pPr>
             <a:r>
-              <a:rPr lang="en-US" sz="2400" dirty="0" smtClean="0">
+              <a:rPr lang="en-US" sz="2400" dirty="0">
                 <a:latin typeface="Times New Roman" pitchFamily="18" charset="0"/>
                 <a:cs typeface="Times New Roman" pitchFamily="18" charset="0"/>
               </a:rPr>
@@ -14207,7 +14058,7 @@
               <a:buChar char="Ø"/>
             </a:pPr>
             <a:r>
-              <a:rPr lang="en-US" sz="2400" dirty="0" smtClean="0">
+              <a:rPr lang="en-US" sz="2400" dirty="0">
                 <a:latin typeface="Times New Roman" pitchFamily="18" charset="0"/>
                 <a:cs typeface="Times New Roman" pitchFamily="18" charset="0"/>
               </a:rPr>
@@ -14220,16 +14071,12 @@
               <a:buChar char="Ø"/>
             </a:pPr>
             <a:r>
-              <a:rPr lang="en-US" sz="2400" dirty="0" smtClean="0">
+              <a:rPr lang="en-US" sz="2400" dirty="0">
                 <a:latin typeface="Times New Roman" pitchFamily="18" charset="0"/>
                 <a:cs typeface="Times New Roman" pitchFamily="18" charset="0"/>
               </a:rPr>
               <a:t>Electronic structure and mechanical properties</a:t>
             </a:r>
-            <a:endParaRPr lang="en-US" sz="2400" dirty="0">
-              <a:latin typeface="Times New Roman" pitchFamily="18" charset="0"/>
-              <a:cs typeface="Times New Roman" pitchFamily="18" charset="0"/>
-            </a:endParaRPr>
           </a:p>
         </p:txBody>
       </p:sp>
@@ -14293,7 +14140,7 @@
           <p:cNvPr id="22" name="Rectangle 21">
             <a:extLst>
               <a:ext uri="{FF2B5EF4-FFF2-40B4-BE49-F238E27FC236}">
-                <a16:creationId xmlns="" xmlns:a16="http://schemas.microsoft.com/office/drawing/2014/main" id="{620A7DEA-950C-4954-B3B7-2672370FABF4}"/>
+                <a16:creationId xmlns:a16="http://schemas.microsoft.com/office/drawing/2014/main" id="{620A7DEA-950C-4954-B3B7-2672370FABF4}"/>
               </a:ext>
             </a:extLst>
           </p:cNvPr>
@@ -14316,13 +14163,13 @@
           <a:lstStyle/>
           <a:p>
             <a:r>
-              <a:rPr lang="en-US" sz="3600" b="1" dirty="0" smtClean="0"/>
+              <a:rPr lang="en-US" sz="3600" b="1" dirty="0"/>
               <a:t>ENGINEERING CHEMISTRY </a:t>
             </a:r>
           </a:p>
           <a:p>
             <a:r>
-              <a:rPr lang="en-IN" sz="2400" b="1" dirty="0" smtClean="0">
+              <a:rPr lang="en-IN" sz="2400" b="1" dirty="0">
                 <a:solidFill>
                   <a:srgbClr val="C00000"/>
                 </a:solidFill>
@@ -14332,7 +14179,7 @@
               <a:t>Module I- </a:t>
             </a:r>
             <a:r>
-              <a:rPr lang="en-US" sz="2400" b="1" dirty="0" smtClean="0">
+              <a:rPr lang="en-US" sz="2400" b="1" dirty="0">
                 <a:solidFill>
                   <a:srgbClr val="C00000"/>
                 </a:solidFill>
@@ -14354,7 +14201,7 @@
           <p:cNvPr id="8" name="Straight Connector 7">
             <a:extLst>
               <a:ext uri="{FF2B5EF4-FFF2-40B4-BE49-F238E27FC236}">
-                <a16:creationId xmlns="" xmlns:a16="http://schemas.microsoft.com/office/drawing/2014/main" id="{A4293697-6E2C-4331-B4E1-C58B355192F4}"/>
+                <a16:creationId xmlns:a16="http://schemas.microsoft.com/office/drawing/2014/main" id="{A4293697-6E2C-4331-B4E1-C58B355192F4}"/>
               </a:ext>
             </a:extLst>
           </p:cNvPr>
@@ -14440,7 +14287,7 @@
           <a:lstStyle/>
           <a:p>
             <a:r>
-              <a:rPr lang="en-US" sz="2400" b="1" dirty="0" smtClean="0">
+              <a:rPr lang="en-US" sz="2400" b="1" dirty="0">
                 <a:latin typeface="Times New Roman" pitchFamily="18" charset="0"/>
                 <a:cs typeface="Times New Roman" pitchFamily="18" charset="0"/>
               </a:rPr>
@@ -14449,16 +14296,12 @@
           </a:p>
           <a:p>
             <a:r>
-              <a:rPr lang="en-US" sz="2400" dirty="0" smtClean="0">
+              <a:rPr lang="en-US" sz="2400" dirty="0">
                 <a:latin typeface="Times New Roman" pitchFamily="18" charset="0"/>
                 <a:cs typeface="Times New Roman" pitchFamily="18" charset="0"/>
               </a:rPr>
               <a:t>To know the underlying reaction mechanism and the kinetics of a reaction mechanism computational chemistry plays a vital role.</a:t>
             </a:r>
-            <a:endParaRPr lang="en-US" sz="2400" dirty="0">
-              <a:latin typeface="Times New Roman" pitchFamily="18" charset="0"/>
-              <a:cs typeface="Times New Roman" pitchFamily="18" charset="0"/>
-            </a:endParaRPr>
           </a:p>
         </p:txBody>
       </p:sp>
@@ -14467,7 +14310,7 @@
           <p:cNvPr id="6" name="Picture 5">
             <a:extLst>
               <a:ext uri="{FF2B5EF4-FFF2-40B4-BE49-F238E27FC236}">
-                <a16:creationId xmlns="" xmlns:a16="http://schemas.microsoft.com/office/drawing/2014/main" id="{FDC699DB-10BC-D36D-E453-253B5C0B93B9}"/>
+                <a16:creationId xmlns:a16="http://schemas.microsoft.com/office/drawing/2014/main" id="{FDC699DB-10BC-D36D-E453-253B5C0B93B9}"/>
               </a:ext>
             </a:extLst>
           </p:cNvPr>
@@ -14497,7 +14340,7 @@
           <p:cNvPr id="9" name="Picture 8">
             <a:extLst>
               <a:ext uri="{FF2B5EF4-FFF2-40B4-BE49-F238E27FC236}">
-                <a16:creationId xmlns="" xmlns:a16="http://schemas.microsoft.com/office/drawing/2014/main" id="{6134E9AE-9DAA-DA14-BB31-5AF9EE295D13}"/>
+                <a16:creationId xmlns:a16="http://schemas.microsoft.com/office/drawing/2014/main" id="{6134E9AE-9DAA-DA14-BB31-5AF9EE295D13}"/>
               </a:ext>
             </a:extLst>
           </p:cNvPr>
@@ -14527,7 +14370,7 @@
           <p:cNvPr id="10" name="TextBox 9">
             <a:extLst>
               <a:ext uri="{FF2B5EF4-FFF2-40B4-BE49-F238E27FC236}">
-                <a16:creationId xmlns="" xmlns:a16="http://schemas.microsoft.com/office/drawing/2014/main" id="{58059C04-7FCD-15CD-E156-0D666C287D7E}"/>
+                <a16:creationId xmlns:a16="http://schemas.microsoft.com/office/drawing/2014/main" id="{58059C04-7FCD-15CD-E156-0D666C287D7E}"/>
               </a:ext>
             </a:extLst>
           </p:cNvPr>
@@ -14570,21 +14413,7 @@
                 <a:latin typeface="Times New Roman" pitchFamily="18" charset="0"/>
                 <a:cs typeface="Times New Roman" pitchFamily="18" charset="0"/>
               </a:rPr>
-              <a:t>Computational modeling enables the rational design of new materials with desired properties  such as high electrical conductivity, thermal stability etc. This leads to the development of advanced materials for energy </a:t>
-            </a:r>
-            <a:r>
-              <a:rPr lang="en-US" sz="2400" dirty="0" smtClean="0">
-                <a:latin typeface="Times New Roman" pitchFamily="18" charset="0"/>
-                <a:cs typeface="Times New Roman" pitchFamily="18" charset="0"/>
-              </a:rPr>
-              <a:t>production and storage </a:t>
-            </a:r>
-            <a:r>
-              <a:rPr lang="en-US" sz="2400" dirty="0">
-                <a:latin typeface="Times New Roman" pitchFamily="18" charset="0"/>
-                <a:cs typeface="Times New Roman" pitchFamily="18" charset="0"/>
-              </a:rPr>
-              <a:t>applications, electronics and much more.</a:t>
+              <a:t>Computational modeling enables the rational design of new materials with desired properties  such as high electrical conductivity, thermal stability etc. This leads to the development of advanced materials for energy production and storage applications, electronics and much more.</a:t>
             </a:r>
           </a:p>
         </p:txBody>
@@ -14599,13 +14428,6 @@
   <p:clrMapOvr>
     <a:masterClrMapping/>
   </p:clrMapOvr>
-  <p:timing>
-    <p:tnLst>
-      <p:par>
-        <p:cTn id="1" dur="indefinite" restart="never" nodeType="tmRoot"/>
-      </p:par>
-    </p:tnLst>
-  </p:timing>
 </p:sld>
 </file>
 
@@ -14631,7 +14453,7 @@
           <p:cNvPr id="22" name="Rectangle 21">
             <a:extLst>
               <a:ext uri="{FF2B5EF4-FFF2-40B4-BE49-F238E27FC236}">
-                <a16:creationId xmlns="" xmlns:a16="http://schemas.microsoft.com/office/drawing/2014/main" id="{620A7DEA-950C-4954-B3B7-2672370FABF4}"/>
+                <a16:creationId xmlns:a16="http://schemas.microsoft.com/office/drawing/2014/main" id="{620A7DEA-950C-4954-B3B7-2672370FABF4}"/>
               </a:ext>
             </a:extLst>
           </p:cNvPr>
@@ -14654,13 +14476,13 @@
           <a:lstStyle/>
           <a:p>
             <a:r>
-              <a:rPr lang="en-US" sz="3600" b="1" dirty="0" smtClean="0"/>
+              <a:rPr lang="en-US" sz="3600" b="1" dirty="0"/>
               <a:t>ENGINEERING CHEMISTRY </a:t>
             </a:r>
           </a:p>
           <a:p>
             <a:r>
-              <a:rPr lang="en-IN" sz="2400" b="1" dirty="0" smtClean="0">
+              <a:rPr lang="en-IN" sz="2400" b="1" dirty="0">
                 <a:solidFill>
                   <a:srgbClr val="C00000"/>
                 </a:solidFill>
@@ -14670,7 +14492,7 @@
               <a:t>Module I- </a:t>
             </a:r>
             <a:r>
-              <a:rPr lang="en-US" sz="2400" b="1" dirty="0" smtClean="0">
+              <a:rPr lang="en-US" sz="2400" b="1" dirty="0">
                 <a:solidFill>
                   <a:srgbClr val="C00000"/>
                 </a:solidFill>
@@ -14692,7 +14514,7 @@
           <p:cNvPr id="8" name="Straight Connector 7">
             <a:extLst>
               <a:ext uri="{FF2B5EF4-FFF2-40B4-BE49-F238E27FC236}">
-                <a16:creationId xmlns="" xmlns:a16="http://schemas.microsoft.com/office/drawing/2014/main" id="{A4293697-6E2C-4331-B4E1-C58B355192F4}"/>
+                <a16:creationId xmlns:a16="http://schemas.microsoft.com/office/drawing/2014/main" id="{A4293697-6E2C-4331-B4E1-C58B355192F4}"/>
               </a:ext>
             </a:extLst>
           </p:cNvPr>
@@ -14761,7 +14583,7 @@
           <p:cNvPr id="5" name="TextBox 4">
             <a:extLst>
               <a:ext uri="{FF2B5EF4-FFF2-40B4-BE49-F238E27FC236}">
-                <a16:creationId xmlns="" xmlns:a16="http://schemas.microsoft.com/office/drawing/2014/main" id="{6FDBE7C9-6021-0979-D22A-9EB83D81B71E}"/>
+                <a16:creationId xmlns:a16="http://schemas.microsoft.com/office/drawing/2014/main" id="{6FDBE7C9-6021-0979-D22A-9EB83D81B71E}"/>
               </a:ext>
             </a:extLst>
           </p:cNvPr>
@@ -14947,10 +14769,9 @@
           <a:lstStyle/>
           <a:p>
             <a:r>
-              <a:rPr lang="en-US" dirty="0" smtClean="0"/>
+              <a:rPr lang="en-US" dirty="0"/>
               <a:t>Paracetamol</a:t>
             </a:r>
-            <a:endParaRPr lang="en-US" dirty="0"/>
           </a:p>
         </p:txBody>
       </p:sp>
@@ -15364,7 +15185,7 @@
   <a:extraClrSchemeLst/>
   <a:extLst>
     <a:ext uri="{05A4C25C-085E-4340-85A3-A5531E510DB2}">
-      <thm15:themeFamily xmlns="" xmlns:thm15="http://schemas.microsoft.com/office/thememl/2012/main" name="Office Theme" id="{62F939B6-93AF-4DB8-9C6B-D6C7DFDC589F}" vid="{4A3C46E8-61CC-4603-A589-7422A47A8E4A}"/>
+      <thm15:themeFamily xmlns:thm15="http://schemas.microsoft.com/office/thememl/2012/main" name="Office Theme" id="{62F939B6-93AF-4DB8-9C6B-D6C7DFDC589F}" vid="{4A3C46E8-61CC-4603-A589-7422A47A8E4A}"/>
     </a:ext>
   </a:extLst>
 </a:theme>

</xml_diff>